<commit_message>
Added correlation of density aand accidents and precipitation and wind chill on accidents
</commit_message>
<xml_diff>
--- a/US Accidents Analysis_Group.pptx
+++ b/US Accidents Analysis_Group.pptx
@@ -5,7 +5,7 @@
     <p:sldMasterId id="2147483660" r:id="rId4"/>
   </p:sldMasterIdLst>
   <p:notesMasterIdLst>
-    <p:notesMasterId r:id="rId20"/>
+    <p:notesMasterId r:id="rId21"/>
   </p:notesMasterIdLst>
   <p:sldIdLst>
     <p:sldId id="278" r:id="rId5"/>
@@ -20,9 +20,10 @@
     <p:sldId id="289" r:id="rId14"/>
     <p:sldId id="292" r:id="rId15"/>
     <p:sldId id="291" r:id="rId16"/>
-    <p:sldId id="287" r:id="rId17"/>
-    <p:sldId id="288" r:id="rId18"/>
-    <p:sldId id="294" r:id="rId19"/>
+    <p:sldId id="296" r:id="rId17"/>
+    <p:sldId id="297" r:id="rId18"/>
+    <p:sldId id="288" r:id="rId19"/>
+    <p:sldId id="294" r:id="rId20"/>
   </p:sldIdLst>
   <p:sldSz cx="12192000" cy="6858000"/>
   <p:notesSz cx="6858000" cy="9144000"/>
@@ -211,7 +212,7 @@
           <a:p>
             <a:fld id="{AFD01546-198A-4195-BCF8-F0FF54C90E5E}" type="datetimeFigureOut">
               <a:rPr lang="en-US" smtClean="0"/>
-              <a:t>6/29/20</a:t>
+              <a:t>6/29/2020</a:t>
             </a:fld>
             <a:endParaRPr lang="en-US" dirty="0"/>
           </a:p>
@@ -891,7 +892,7 @@
           <a:p>
             <a:fld id="{88D38747-4367-4BD2-8D51-C97E202738E2}" type="datetime1">
               <a:rPr lang="en-US" smtClean="0"/>
-              <a:t>6/29/20</a:t>
+              <a:t>6/29/2020</a:t>
             </a:fld>
             <a:endParaRPr lang="en-US" dirty="0"/>
           </a:p>
@@ -1196,7 +1197,7 @@
           <a:p>
             <a:fld id="{11F1B079-7EF0-44EE-B798-BCC497C9F3B2}" type="datetime1">
               <a:rPr lang="en-US" smtClean="0"/>
-              <a:t>6/29/20</a:t>
+              <a:t>6/29/2020</a:t>
             </a:fld>
             <a:endParaRPr lang="en-US" dirty="0"/>
           </a:p>
@@ -1390,7 +1391,7 @@
           <a:p>
             <a:fld id="{28FF70A8-1D13-4657-95F0-A9EA54967B8D}" type="datetime1">
               <a:rPr lang="en-US" smtClean="0"/>
-              <a:t>6/29/20</a:t>
+              <a:t>6/29/2020</a:t>
             </a:fld>
             <a:endParaRPr lang="en-US" dirty="0"/>
           </a:p>
@@ -1653,7 +1654,7 @@
           <a:p>
             <a:fld id="{21EB90AC-71BD-4C7F-8ACA-7B3F18292E63}" type="datetime1">
               <a:rPr lang="en-US" smtClean="0"/>
-              <a:t>6/29/20</a:t>
+              <a:t>6/29/2020</a:t>
             </a:fld>
             <a:endParaRPr lang="en-US" dirty="0"/>
           </a:p>
@@ -2089,7 +2090,7 @@
           <a:p>
             <a:fld id="{4E6EFC2C-8905-46F0-B443-CE905B76BA01}" type="datetime1">
               <a:rPr lang="en-US" smtClean="0"/>
-              <a:t>6/29/20</a:t>
+              <a:t>6/29/2020</a:t>
             </a:fld>
             <a:endParaRPr lang="en-US" dirty="0"/>
           </a:p>
@@ -2626,7 +2627,7 @@
           <a:p>
             <a:fld id="{D9079DC3-C9B5-499E-9140-0DC28B7074E2}" type="datetime1">
               <a:rPr lang="en-US" smtClean="0"/>
-              <a:t>6/29/20</a:t>
+              <a:t>6/29/2020</a:t>
             </a:fld>
             <a:endParaRPr lang="en-US" dirty="0"/>
           </a:p>
@@ -3508,7 +3509,7 @@
           <a:p>
             <a:fld id="{30BB33EA-E472-4D22-9C03-A9C14AA21CED}" type="datetime1">
               <a:rPr lang="en-US" smtClean="0"/>
-              <a:t>6/29/20</a:t>
+              <a:t>6/29/2020</a:t>
             </a:fld>
             <a:endParaRPr lang="en-US" dirty="0"/>
           </a:p>
@@ -3678,7 +3679,7 @@
           <a:p>
             <a:fld id="{73C55A3C-5767-4844-A0A3-83778C2E5409}" type="datetime1">
               <a:rPr lang="en-US" smtClean="0"/>
-              <a:t>6/29/20</a:t>
+              <a:t>6/29/2020</a:t>
             </a:fld>
             <a:endParaRPr lang="en-US" dirty="0"/>
           </a:p>
@@ -3922,7 +3923,7 @@
           <a:p>
             <a:fld id="{CAE507A8-A5CF-4D38-AB86-7EDDA87A85D4}" type="datetime1">
               <a:rPr lang="en-US" smtClean="0"/>
-              <a:t>6/29/20</a:t>
+              <a:t>6/29/2020</a:t>
             </a:fld>
             <a:endParaRPr lang="en-US" dirty="0"/>
           </a:p>
@@ -4164,7 +4165,7 @@
           <a:p>
             <a:fld id="{BDFCD27C-8599-43EF-BA1D-14DDC1946E06}" type="datetime1">
               <a:rPr lang="en-US" smtClean="0"/>
-              <a:t>6/29/20</a:t>
+              <a:t>6/29/2020</a:t>
             </a:fld>
             <a:endParaRPr lang="en-US" dirty="0"/>
           </a:p>
@@ -4647,7 +4648,7 @@
           <a:p>
             <a:fld id="{49343D99-809A-49C0-96E5-4250D0B498EE}" type="datetime1">
               <a:rPr lang="en-US" smtClean="0"/>
-              <a:t>6/29/20</a:t>
+              <a:t>6/29/2020</a:t>
             </a:fld>
             <a:endParaRPr lang="en-US" dirty="0"/>
           </a:p>
@@ -4765,7 +4766,7 @@
           <a:p>
             <a:fld id="{A143DE9B-B678-4EFB-BB7D-A4370204A0B0}" type="datetime1">
               <a:rPr lang="en-US" smtClean="0"/>
-              <a:t>6/29/20</a:t>
+              <a:t>6/29/2020</a:t>
             </a:fld>
             <a:endParaRPr lang="en-US" dirty="0"/>
           </a:p>
@@ -4860,7 +4861,7 @@
           <a:p>
             <a:fld id="{E68812DA-F765-4142-A6A3-A8ED7235E082}" type="datetime1">
               <a:rPr lang="en-US" smtClean="0"/>
-              <a:t>6/29/20</a:t>
+              <a:t>6/29/2020</a:t>
             </a:fld>
             <a:endParaRPr lang="en-US" dirty="0"/>
           </a:p>
@@ -5115,7 +5116,7 @@
           <a:p>
             <a:fld id="{3E0277FD-7DE6-41D4-930D-AC99F5AFE54E}" type="datetime1">
               <a:rPr lang="en-US" smtClean="0"/>
-              <a:t>6/29/20</a:t>
+              <a:t>6/29/2020</a:t>
             </a:fld>
             <a:endParaRPr lang="en-US" dirty="0"/>
           </a:p>
@@ -5422,7 +5423,7 @@
           <a:p>
             <a:fld id="{9EA15526-7079-4B7B-987C-1B5FAE11A0FF}" type="datetime1">
               <a:rPr lang="en-US" smtClean="0"/>
-              <a:t>6/29/20</a:t>
+              <a:t>6/29/2020</a:t>
             </a:fld>
             <a:endParaRPr lang="en-US" dirty="0"/>
           </a:p>
@@ -5657,7 +5658,7 @@
           <a:p>
             <a:fld id="{073ED0CC-082F-4160-86E5-0D6041F12778}" type="datetime1">
               <a:rPr lang="en-US" smtClean="0"/>
-              <a:t>6/29/20</a:t>
+              <a:t>6/29/2020</a:t>
             </a:fld>
             <a:endParaRPr lang="en-US" dirty="0"/>
           </a:p>
@@ -6575,7 +6576,7 @@
           </a:effectLst>
           <a:extLst>
             <a:ext uri="{91240B29-F687-4f45-9708-019B960494DF}">
-              <a14:hiddenLine xmlns="" xmlns:a14="http://schemas.microsoft.com/office/drawing/2010/main" xmlns:p14="http://schemas.microsoft.com/office/powerpoint/2010/main" xmlns:a16="http://schemas.microsoft.com/office/drawing/2014/main" w="9525">
+              <a14:hiddenLine xmlns:a16="http://schemas.microsoft.com/office/drawing/2014/main" xmlns:p14="http://schemas.microsoft.com/office/powerpoint/2010/main" xmlns:a14="http://schemas.microsoft.com/office/drawing/2010/main" xmlns="" w="9525">
                 <a:solidFill>
                   <a:srgbClr val="000000"/>
                 </a:solidFill>
@@ -7676,7 +7677,7 @@
         </p:spPr>
         <p:txBody>
           <a:bodyPr vert="horz" lIns="91440" tIns="45720" rIns="91440" bIns="45720" rtlCol="0" anchor="ctr">
-            <a:normAutofit fontScale="92500" lnSpcReduction="20000"/>
+            <a:normAutofit fontScale="92500"/>
           </a:bodyPr>
           <a:lstStyle/>
           <a:p>
@@ -7688,19 +7689,19 @@
           <a:p>
             <a:r>
               <a:rPr lang="en-US" dirty="0"/>
-              <a:t>Weather related accidents account at least to 12.4% of accidents in the US for the period of time studied.</a:t>
+              <a:t>Weather related accidents account at least to 12.4% of accidents in the US for the time period studied.</a:t>
             </a:r>
           </a:p>
           <a:p>
             <a:r>
               <a:rPr lang="en-US" dirty="0"/>
-              <a:t>Within the weather categories created, rain accounts for 64.1 % of weather related accidents.</a:t>
+              <a:t>Within the weather categories created, rain accounts for 64.1 % of weather-related accidents.</a:t>
             </a:r>
           </a:p>
           <a:p>
             <a:r>
               <a:rPr lang="en-US" dirty="0"/>
-              <a:t>Wet road accidents or sleek pavement have not be accounted for and need to be further studied. </a:t>
+              <a:t>Wet road accidents or sleek pavement have not been accounted for and need to be further studied. </a:t>
             </a:r>
           </a:p>
           <a:p>
@@ -7844,10 +7845,10 @@
       </p:grpSpPr>
       <p:sp>
         <p:nvSpPr>
-          <p:cNvPr id="2" name="Title 1">
+          <p:cNvPr id="14" name="Title 1">
             <a:extLst>
               <a:ext uri="{FF2B5EF4-FFF2-40B4-BE49-F238E27FC236}">
-                <a16:creationId xmlns:a16="http://schemas.microsoft.com/office/drawing/2014/main" id="{0B95A5CF-1A00-8349-8B63-95A0A6ED6A9F}"/>
+                <a16:creationId xmlns:a16="http://schemas.microsoft.com/office/drawing/2014/main" id="{6B17262A-FAB2-47B4-846B-7F12685E7C2D}"/>
               </a:ext>
             </a:extLst>
           </p:cNvPr>
@@ -7877,108 +7878,19 @@
           </a:p>
         </p:txBody>
       </p:sp>
-      <p:sp>
-        <p:nvSpPr>
-          <p:cNvPr id="3" name="Text Placeholder 2">
+      <p:pic>
+        <p:nvPicPr>
+          <p:cNvPr id="15" name="Content Placeholder 7" descr="A screenshot of a map&#10;&#10;Description automatically generated">
             <a:extLst>
               <a:ext uri="{FF2B5EF4-FFF2-40B4-BE49-F238E27FC236}">
-                <a16:creationId xmlns:a16="http://schemas.microsoft.com/office/drawing/2014/main" id="{3BE11967-2B4C-E843-82D7-2D1C530BDD7F}"/>
-              </a:ext>
-            </a:extLst>
-          </p:cNvPr>
-          <p:cNvSpPr>
-            <a:spLocks noGrp="1"/>
-          </p:cNvSpPr>
-          <p:nvPr>
-            <p:ph type="body" idx="1"/>
-          </p:nvPr>
-        </p:nvSpPr>
-        <p:spPr>
-          <a:xfrm>
-            <a:off x="7965195" y="1630497"/>
-            <a:ext cx="3868006" cy="5585552"/>
-          </a:xfrm>
-        </p:spPr>
-        <p:txBody>
-          <a:bodyPr anchor="t"/>
-          <a:lstStyle/>
-          <a:p>
-            <a:pPr marL="342900" indent="-342900" algn="l">
-              <a:buFont typeface="Arial" panose="020B0604020202020204" pitchFamily="34" charset="0"/>
-              <a:buChar char="•"/>
-            </a:pPr>
-            <a:r>
-              <a:rPr lang="en-US" sz="1800" dirty="0"/>
-              <a:t>Most of the accidents happen at visibility of 10 mi and same was removed from the dataset.</a:t>
-            </a:r>
-          </a:p>
-          <a:p>
-            <a:pPr marL="342900" indent="-342900" algn="l">
-              <a:buFont typeface="Arial" panose="020B0604020202020204" pitchFamily="34" charset="0"/>
-              <a:buChar char="•"/>
-            </a:pPr>
-            <a:r>
-              <a:rPr lang="en-US" sz="1800" dirty="0"/>
-              <a:t>Rows of data with wind speed greater than 100 mph was removed. </a:t>
-            </a:r>
-          </a:p>
-          <a:p>
-            <a:pPr marL="342900" indent="-342900" algn="l">
-              <a:buFont typeface="Arial" panose="020B0604020202020204" pitchFamily="34" charset="0"/>
-              <a:buChar char="•"/>
-            </a:pPr>
-            <a:r>
-              <a:rPr lang="en-US" sz="1800" dirty="0"/>
-              <a:t>Accidents have little correlation to temperature.</a:t>
-            </a:r>
-          </a:p>
-          <a:p>
-            <a:pPr marL="342900" indent="-342900" algn="l">
-              <a:buFont typeface="Arial" panose="020B0604020202020204" pitchFamily="34" charset="0"/>
-              <a:buChar char="•"/>
-            </a:pPr>
-            <a:r>
-              <a:rPr lang="en-US" sz="1800" dirty="0"/>
-              <a:t>Accidents have a strong correlation to humidity</a:t>
-            </a:r>
-          </a:p>
-          <a:p>
-            <a:pPr marL="342900" indent="-342900" algn="l">
-              <a:buFont typeface="Arial" panose="020B0604020202020204" pitchFamily="34" charset="0"/>
-              <a:buChar char="•"/>
-            </a:pPr>
-            <a:r>
-              <a:rPr lang="en-US" sz="1800" dirty="0"/>
-              <a:t>Accidents have a weak negative correlation to visibility </a:t>
-            </a:r>
-          </a:p>
-          <a:p>
-            <a:pPr marL="342900" indent="-342900" algn="l">
-              <a:buFont typeface="Arial" panose="020B0604020202020204" pitchFamily="34" charset="0"/>
-              <a:buChar char="•"/>
-            </a:pPr>
-            <a:r>
-              <a:rPr lang="en-US" sz="1800" dirty="0"/>
-              <a:t>Accidents have a moderate negative correlation to wind speed. </a:t>
-            </a:r>
-          </a:p>
-        </p:txBody>
-      </p:sp>
-      <p:pic>
-        <p:nvPicPr>
-          <p:cNvPr id="8" name="Content Placeholder 7" descr="A screenshot of a map&#10;&#10;Description automatically generated">
-            <a:extLst>
-              <a:ext uri="{FF2B5EF4-FFF2-40B4-BE49-F238E27FC236}">
-                <a16:creationId xmlns:a16="http://schemas.microsoft.com/office/drawing/2014/main" id="{19022E4F-5120-9F46-AB2A-816893A9510A}"/>
+                <a16:creationId xmlns:a16="http://schemas.microsoft.com/office/drawing/2014/main" id="{AAC29350-8729-48B5-936A-25E908534248}"/>
               </a:ext>
             </a:extLst>
           </p:cNvPr>
           <p:cNvPicPr>
-            <a:picLocks noGrp="1" noChangeAspect="1"/>
+            <a:picLocks noChangeAspect="1"/>
           </p:cNvPicPr>
-          <p:nvPr>
-            <p:ph sz="half" idx="2"/>
-          </p:nvPr>
+          <p:nvPr/>
         </p:nvPicPr>
         <p:blipFill>
           <a:blip r:embed="rId2"/>
@@ -7988,15 +7900,469 @@
         </p:blipFill>
         <p:spPr>
           <a:xfrm>
-            <a:off x="358799" y="1763815"/>
-            <a:ext cx="7487800" cy="4261297"/>
-          </a:xfrm>
+            <a:off x="314411" y="1461976"/>
+            <a:ext cx="7383567" cy="4201978"/>
+          </a:xfrm>
+          <a:prstGeom prst="rect">
+            <a:avLst/>
+          </a:prstGeom>
+          <a:effectLst>
+            <a:outerShdw blurRad="25400" dir="17880000">
+              <a:srgbClr val="000000">
+                <a:alpha val="46000"/>
+              </a:srgbClr>
+            </a:outerShdw>
+          </a:effectLst>
         </p:spPr>
       </p:pic>
+      <p:sp>
+        <p:nvSpPr>
+          <p:cNvPr id="16" name="Text Placeholder 2">
+            <a:extLst>
+              <a:ext uri="{FF2B5EF4-FFF2-40B4-BE49-F238E27FC236}">
+                <a16:creationId xmlns:a16="http://schemas.microsoft.com/office/drawing/2014/main" id="{C30166F9-402E-42FC-83B2-B8C546174052}"/>
+              </a:ext>
+            </a:extLst>
+          </p:cNvPr>
+          <p:cNvSpPr txBox="1">
+            <a:spLocks/>
+          </p:cNvSpPr>
+          <p:nvPr/>
+        </p:nvSpPr>
+        <p:spPr>
+          <a:xfrm>
+            <a:off x="7965194" y="1452947"/>
+            <a:ext cx="3868007" cy="4934498"/>
+          </a:xfrm>
+          <a:prstGeom prst="rect">
+            <a:avLst/>
+          </a:prstGeom>
+          <a:effectLst>
+            <a:outerShdw blurRad="25400" dir="17880000">
+              <a:srgbClr val="000000">
+                <a:alpha val="46000"/>
+              </a:srgbClr>
+            </a:outerShdw>
+          </a:effectLst>
+        </p:spPr>
+        <p:txBody>
+          <a:bodyPr vert="horz" lIns="91440" tIns="45720" rIns="91440" bIns="45720" rtlCol="0" anchor="t">
+            <a:normAutofit/>
+          </a:bodyPr>
+          <a:lstStyle>
+            <a:lvl1pPr marL="342900" indent="-306000" algn="l" defTabSz="457200" rtl="0" eaLnBrk="1" latinLnBrk="0" hangingPunct="1">
+              <a:lnSpc>
+                <a:spcPct val="110000"/>
+              </a:lnSpc>
+              <a:spcBef>
+                <a:spcPct val="20000"/>
+              </a:spcBef>
+              <a:spcAft>
+                <a:spcPts val="600"/>
+              </a:spcAft>
+              <a:buClr>
+                <a:schemeClr val="tx2"/>
+              </a:buClr>
+              <a:buSzPct val="70000"/>
+              <a:buFont typeface="Wingdings 2" charset="2"/>
+              <a:buChar char=""/>
+              <a:defRPr sz="2300" kern="1200">
+                <a:ln>
+                  <a:solidFill>
+                    <a:schemeClr val="bg1">
+                      <a:lumMod val="75000"/>
+                      <a:lumOff val="25000"/>
+                      <a:alpha val="10000"/>
+                    </a:schemeClr>
+                  </a:solidFill>
+                </a:ln>
+                <a:solidFill>
+                  <a:schemeClr val="tx2"/>
+                </a:solidFill>
+                <a:effectLst>
+                  <a:outerShdw blurRad="9525" dist="25400" dir="14640000" algn="tl" rotWithShape="0">
+                    <a:schemeClr val="bg1">
+                      <a:alpha val="30000"/>
+                    </a:schemeClr>
+                  </a:outerShdw>
+                </a:effectLst>
+                <a:latin typeface="+mn-lt"/>
+                <a:ea typeface="+mn-ea"/>
+                <a:cs typeface="+mn-cs"/>
+              </a:defRPr>
+            </a:lvl1pPr>
+            <a:lvl2pPr marL="720000" indent="-270000" algn="l" defTabSz="457200" rtl="0" eaLnBrk="1" latinLnBrk="0" hangingPunct="1">
+              <a:spcBef>
+                <a:spcPct val="20000"/>
+              </a:spcBef>
+              <a:spcAft>
+                <a:spcPts val="600"/>
+              </a:spcAft>
+              <a:buClr>
+                <a:schemeClr val="tx2"/>
+              </a:buClr>
+              <a:buSzPct val="70000"/>
+              <a:buFont typeface="Wingdings 2" charset="2"/>
+              <a:buChar char=""/>
+              <a:defRPr sz="2100" kern="1200">
+                <a:ln>
+                  <a:solidFill>
+                    <a:schemeClr val="bg1">
+                      <a:lumMod val="75000"/>
+                      <a:lumOff val="25000"/>
+                      <a:alpha val="10000"/>
+                    </a:schemeClr>
+                  </a:solidFill>
+                </a:ln>
+                <a:solidFill>
+                  <a:schemeClr val="tx2"/>
+                </a:solidFill>
+                <a:effectLst>
+                  <a:outerShdw blurRad="9525" dist="25400" dir="14640000" algn="tl" rotWithShape="0">
+                    <a:schemeClr val="bg1">
+                      <a:alpha val="30000"/>
+                    </a:schemeClr>
+                  </a:outerShdw>
+                </a:effectLst>
+                <a:latin typeface="+mn-lt"/>
+                <a:ea typeface="+mn-ea"/>
+                <a:cs typeface="+mn-cs"/>
+              </a:defRPr>
+            </a:lvl2pPr>
+            <a:lvl3pPr marL="1026000" indent="-216000" algn="l" defTabSz="457200" rtl="0" eaLnBrk="1" latinLnBrk="0" hangingPunct="1">
+              <a:spcBef>
+                <a:spcPct val="20000"/>
+              </a:spcBef>
+              <a:spcAft>
+                <a:spcPts val="600"/>
+              </a:spcAft>
+              <a:buClr>
+                <a:schemeClr val="tx2"/>
+              </a:buClr>
+              <a:buSzPct val="70000"/>
+              <a:buFont typeface="Wingdings 2" charset="2"/>
+              <a:buChar char=""/>
+              <a:defRPr sz="1800" kern="1200">
+                <a:ln>
+                  <a:solidFill>
+                    <a:schemeClr val="bg1">
+                      <a:lumMod val="75000"/>
+                      <a:lumOff val="25000"/>
+                      <a:alpha val="10000"/>
+                    </a:schemeClr>
+                  </a:solidFill>
+                </a:ln>
+                <a:solidFill>
+                  <a:schemeClr val="tx2"/>
+                </a:solidFill>
+                <a:effectLst>
+                  <a:outerShdw blurRad="9525" dist="25400" dir="14640000" algn="tl" rotWithShape="0">
+                    <a:schemeClr val="bg1">
+                      <a:alpha val="30000"/>
+                    </a:schemeClr>
+                  </a:outerShdw>
+                </a:effectLst>
+                <a:latin typeface="+mn-lt"/>
+                <a:ea typeface="+mn-ea"/>
+                <a:cs typeface="+mn-cs"/>
+              </a:defRPr>
+            </a:lvl3pPr>
+            <a:lvl4pPr marL="1386000" indent="-216000" algn="l" defTabSz="457200" rtl="0" eaLnBrk="1" latinLnBrk="0" hangingPunct="1">
+              <a:spcBef>
+                <a:spcPct val="20000"/>
+              </a:spcBef>
+              <a:spcAft>
+                <a:spcPts val="600"/>
+              </a:spcAft>
+              <a:buClr>
+                <a:schemeClr val="tx2"/>
+              </a:buClr>
+              <a:buSzPct val="70000"/>
+              <a:buFont typeface="Wingdings 2" charset="2"/>
+              <a:buChar char=""/>
+              <a:defRPr sz="1600" kern="1200">
+                <a:ln>
+                  <a:solidFill>
+                    <a:schemeClr val="bg1">
+                      <a:lumMod val="75000"/>
+                      <a:lumOff val="25000"/>
+                      <a:alpha val="10000"/>
+                    </a:schemeClr>
+                  </a:solidFill>
+                </a:ln>
+                <a:solidFill>
+                  <a:schemeClr val="tx2"/>
+                </a:solidFill>
+                <a:effectLst>
+                  <a:outerShdw blurRad="9525" dist="25400" dir="14640000" algn="tl" rotWithShape="0">
+                    <a:schemeClr val="bg1">
+                      <a:alpha val="30000"/>
+                    </a:schemeClr>
+                  </a:outerShdw>
+                </a:effectLst>
+                <a:latin typeface="+mn-lt"/>
+                <a:ea typeface="+mn-ea"/>
+                <a:cs typeface="+mn-cs"/>
+              </a:defRPr>
+            </a:lvl4pPr>
+            <a:lvl5pPr marL="1674000" indent="-216000" algn="l" defTabSz="457200" rtl="0" eaLnBrk="1" latinLnBrk="0" hangingPunct="1">
+              <a:spcBef>
+                <a:spcPct val="20000"/>
+              </a:spcBef>
+              <a:spcAft>
+                <a:spcPts val="600"/>
+              </a:spcAft>
+              <a:buClr>
+                <a:schemeClr val="tx2"/>
+              </a:buClr>
+              <a:buSzPct val="70000"/>
+              <a:buFont typeface="Wingdings 2" charset="2"/>
+              <a:buChar char=""/>
+              <a:defRPr sz="1600" kern="1200">
+                <a:ln>
+                  <a:solidFill>
+                    <a:schemeClr val="bg1">
+                      <a:lumMod val="75000"/>
+                      <a:lumOff val="25000"/>
+                      <a:alpha val="10000"/>
+                    </a:schemeClr>
+                  </a:solidFill>
+                </a:ln>
+                <a:solidFill>
+                  <a:schemeClr val="tx2"/>
+                </a:solidFill>
+                <a:effectLst>
+                  <a:outerShdw blurRad="9525" dist="25400" dir="14640000" algn="tl" rotWithShape="0">
+                    <a:schemeClr val="bg1">
+                      <a:alpha val="30000"/>
+                    </a:schemeClr>
+                  </a:outerShdw>
+                </a:effectLst>
+                <a:latin typeface="+mn-lt"/>
+                <a:ea typeface="+mn-ea"/>
+                <a:cs typeface="+mn-cs"/>
+              </a:defRPr>
+            </a:lvl5pPr>
+            <a:lvl6pPr marL="2014600" indent="-228600" algn="l" defTabSz="457200" rtl="0" eaLnBrk="1" latinLnBrk="0" hangingPunct="1">
+              <a:spcBef>
+                <a:spcPct val="20000"/>
+              </a:spcBef>
+              <a:spcAft>
+                <a:spcPts val="600"/>
+              </a:spcAft>
+              <a:buClr>
+                <a:schemeClr val="tx2"/>
+              </a:buClr>
+              <a:buSzPct val="70000"/>
+              <a:buFont typeface="Wingdings 2" charset="2"/>
+              <a:buChar char=""/>
+              <a:defRPr sz="1400" kern="1200">
+                <a:ln>
+                  <a:solidFill>
+                    <a:schemeClr val="bg1">
+                      <a:lumMod val="75000"/>
+                      <a:lumOff val="25000"/>
+                      <a:alpha val="10000"/>
+                    </a:schemeClr>
+                  </a:solidFill>
+                </a:ln>
+                <a:solidFill>
+                  <a:schemeClr val="tx2"/>
+                </a:solidFill>
+                <a:effectLst>
+                  <a:outerShdw blurRad="9525" dist="25400" dir="14640000" algn="tl" rotWithShape="0">
+                    <a:schemeClr val="bg1">
+                      <a:alpha val="30000"/>
+                    </a:schemeClr>
+                  </a:outerShdw>
+                </a:effectLst>
+                <a:latin typeface="+mn-lt"/>
+                <a:ea typeface="+mn-ea"/>
+                <a:cs typeface="+mn-cs"/>
+              </a:defRPr>
+            </a:lvl6pPr>
+            <a:lvl7pPr marL="2401800" indent="-228600" algn="l" defTabSz="457200" rtl="0" eaLnBrk="1" latinLnBrk="0" hangingPunct="1">
+              <a:spcBef>
+                <a:spcPct val="20000"/>
+              </a:spcBef>
+              <a:spcAft>
+                <a:spcPts val="600"/>
+              </a:spcAft>
+              <a:buClr>
+                <a:schemeClr val="tx2"/>
+              </a:buClr>
+              <a:buSzPct val="70000"/>
+              <a:buFont typeface="Wingdings 2" charset="2"/>
+              <a:buChar char=""/>
+              <a:defRPr sz="1400" kern="1200">
+                <a:ln>
+                  <a:solidFill>
+                    <a:schemeClr val="bg1">
+                      <a:lumMod val="75000"/>
+                      <a:lumOff val="25000"/>
+                      <a:alpha val="10000"/>
+                    </a:schemeClr>
+                  </a:solidFill>
+                </a:ln>
+                <a:solidFill>
+                  <a:schemeClr val="tx2"/>
+                </a:solidFill>
+                <a:effectLst>
+                  <a:outerShdw blurRad="9525" dist="25400" dir="14640000" algn="tl" rotWithShape="0">
+                    <a:schemeClr val="bg1">
+                      <a:alpha val="30000"/>
+                    </a:schemeClr>
+                  </a:outerShdw>
+                </a:effectLst>
+                <a:latin typeface="+mn-lt"/>
+                <a:ea typeface="+mn-ea"/>
+                <a:cs typeface="+mn-cs"/>
+              </a:defRPr>
+            </a:lvl7pPr>
+            <a:lvl8pPr marL="2789000" indent="-228600" algn="l" defTabSz="457200" rtl="0" eaLnBrk="1" latinLnBrk="0" hangingPunct="1">
+              <a:spcBef>
+                <a:spcPct val="20000"/>
+              </a:spcBef>
+              <a:spcAft>
+                <a:spcPts val="600"/>
+              </a:spcAft>
+              <a:buClr>
+                <a:schemeClr val="tx2"/>
+              </a:buClr>
+              <a:buSzPct val="70000"/>
+              <a:buFont typeface="Wingdings 2" charset="2"/>
+              <a:buChar char=""/>
+              <a:defRPr sz="1400" kern="1200">
+                <a:ln>
+                  <a:solidFill>
+                    <a:schemeClr val="bg1">
+                      <a:lumMod val="75000"/>
+                      <a:lumOff val="25000"/>
+                      <a:alpha val="10000"/>
+                    </a:schemeClr>
+                  </a:solidFill>
+                </a:ln>
+                <a:solidFill>
+                  <a:schemeClr val="tx2"/>
+                </a:solidFill>
+                <a:effectLst>
+                  <a:outerShdw blurRad="9525" dist="25400" dir="14640000" algn="tl" rotWithShape="0">
+                    <a:schemeClr val="bg1">
+                      <a:alpha val="30000"/>
+                    </a:schemeClr>
+                  </a:outerShdw>
+                </a:effectLst>
+                <a:latin typeface="+mn-lt"/>
+                <a:ea typeface="+mn-ea"/>
+                <a:cs typeface="+mn-cs"/>
+              </a:defRPr>
+            </a:lvl8pPr>
+            <a:lvl9pPr marL="3106200" indent="-228600" algn="l" defTabSz="457200" rtl="0" eaLnBrk="1" latinLnBrk="0" hangingPunct="1">
+              <a:spcBef>
+                <a:spcPct val="20000"/>
+              </a:spcBef>
+              <a:spcAft>
+                <a:spcPts val="600"/>
+              </a:spcAft>
+              <a:buClr>
+                <a:schemeClr val="tx2"/>
+              </a:buClr>
+              <a:buSzPct val="70000"/>
+              <a:buFont typeface="Wingdings 2" charset="2"/>
+              <a:buChar char=""/>
+              <a:defRPr sz="1400" kern="1200">
+                <a:ln>
+                  <a:solidFill>
+                    <a:schemeClr val="bg1">
+                      <a:lumMod val="75000"/>
+                      <a:lumOff val="25000"/>
+                      <a:alpha val="10000"/>
+                    </a:schemeClr>
+                  </a:solidFill>
+                </a:ln>
+                <a:solidFill>
+                  <a:schemeClr val="tx2"/>
+                </a:solidFill>
+                <a:effectLst>
+                  <a:outerShdw blurRad="9525" dist="25400" dir="14640000" algn="tl" rotWithShape="0">
+                    <a:schemeClr val="bg1">
+                      <a:alpha val="30000"/>
+                    </a:schemeClr>
+                  </a:outerShdw>
+                </a:effectLst>
+                <a:latin typeface="+mn-lt"/>
+                <a:ea typeface="+mn-ea"/>
+                <a:cs typeface="+mn-cs"/>
+              </a:defRPr>
+            </a:lvl9pPr>
+          </a:lstStyle>
+          <a:p>
+            <a:pPr indent="-342900">
+              <a:buFont typeface="Arial" panose="020B0604020202020204" pitchFamily="34" charset="0"/>
+              <a:buChar char="•"/>
+            </a:pPr>
+            <a:r>
+              <a:rPr lang="en-US" sz="1800"/>
+              <a:t>Most of the accidents happen at visibility of 10 mi and same was removed from the dataset.</a:t>
+            </a:r>
+          </a:p>
+          <a:p>
+            <a:pPr indent="-342900">
+              <a:buFont typeface="Arial" panose="020B0604020202020204" pitchFamily="34" charset="0"/>
+              <a:buChar char="•"/>
+            </a:pPr>
+            <a:r>
+              <a:rPr lang="en-US" sz="1800"/>
+              <a:t>Rows of data with wind speed greater than 100 mph was removed. </a:t>
+            </a:r>
+          </a:p>
+          <a:p>
+            <a:pPr indent="-342900">
+              <a:buFont typeface="Arial" panose="020B0604020202020204" pitchFamily="34" charset="0"/>
+              <a:buChar char="•"/>
+            </a:pPr>
+            <a:r>
+              <a:rPr lang="en-US" sz="1800"/>
+              <a:t>Accidents have little correlation to temperature.</a:t>
+            </a:r>
+          </a:p>
+          <a:p>
+            <a:pPr indent="-342900">
+              <a:buFont typeface="Arial" panose="020B0604020202020204" pitchFamily="34" charset="0"/>
+              <a:buChar char="•"/>
+            </a:pPr>
+            <a:r>
+              <a:rPr lang="en-US" sz="1800"/>
+              <a:t>Accidents have a strong correlation to humidity</a:t>
+            </a:r>
+          </a:p>
+          <a:p>
+            <a:pPr indent="-342900">
+              <a:buFont typeface="Arial" panose="020B0604020202020204" pitchFamily="34" charset="0"/>
+              <a:buChar char="•"/>
+            </a:pPr>
+            <a:r>
+              <a:rPr lang="en-US" sz="1800"/>
+              <a:t>Accidents have a weak negative correlation to visibility </a:t>
+            </a:r>
+          </a:p>
+          <a:p>
+            <a:pPr indent="-342900">
+              <a:buFont typeface="Arial" panose="020B0604020202020204" pitchFamily="34" charset="0"/>
+              <a:buChar char="•"/>
+            </a:pPr>
+            <a:r>
+              <a:rPr lang="en-US" sz="1800"/>
+              <a:t>Accidents have a moderate negative correlation to wind speed. </a:t>
+            </a:r>
+            <a:endParaRPr lang="en-US" sz="1800" dirty="0"/>
+          </a:p>
+        </p:txBody>
+      </p:sp>
     </p:spTree>
     <p:extLst>
       <p:ext uri="{BB962C8B-B14F-4D97-AF65-F5344CB8AC3E}">
-        <p14:creationId xmlns:p14="http://schemas.microsoft.com/office/powerpoint/2010/main" val="191598937"/>
+        <p14:creationId xmlns:p14="http://schemas.microsoft.com/office/powerpoint/2010/main" val="158774909"/>
       </p:ext>
     </p:extLst>
   </p:cSld>
@@ -8025,10 +8391,10 @@
       </p:grpSpPr>
       <p:sp>
         <p:nvSpPr>
-          <p:cNvPr id="2" name="Title 1">
+          <p:cNvPr id="14" name="Title 1">
             <a:extLst>
               <a:ext uri="{FF2B5EF4-FFF2-40B4-BE49-F238E27FC236}">
-                <a16:creationId xmlns:a16="http://schemas.microsoft.com/office/drawing/2014/main" id="{F84ECC37-3C78-7046-A8E3-78CB68461166}"/>
+                <a16:creationId xmlns:a16="http://schemas.microsoft.com/office/drawing/2014/main" id="{6B17262A-FAB2-47B4-846B-7F12685E7C2D}"/>
               </a:ext>
             </a:extLst>
           </p:cNvPr>
@@ -8041,84 +8407,873 @@
         </p:nvSpPr>
         <p:spPr>
           <a:xfrm>
-            <a:off x="913795" y="298276"/>
-            <a:ext cx="10353762" cy="1257300"/>
-          </a:xfrm>
-        </p:spPr>
-        <p:txBody>
-          <a:bodyPr/>
+            <a:off x="919119" y="204186"/>
+            <a:ext cx="10353762" cy="1059269"/>
+          </a:xfrm>
+        </p:spPr>
+        <p:txBody>
+          <a:bodyPr>
+            <a:normAutofit fontScale="90000"/>
+          </a:bodyPr>
           <a:lstStyle/>
           <a:p>
             <a:r>
               <a:rPr lang="en-US" dirty="0"/>
-              <a:t>Conclusions</a:t>
-            </a:r>
-          </a:p>
-        </p:txBody>
-      </p:sp>
-      <p:sp>
-        <p:nvSpPr>
-          <p:cNvPr id="4" name="Content Placeholder 3">
+              <a:t>Cumulative Impact of Factors on Traffic Accidents</a:t>
+            </a:r>
+          </a:p>
+        </p:txBody>
+      </p:sp>
+      <p:sp>
+        <p:nvSpPr>
+          <p:cNvPr id="16" name="Text Placeholder 2">
             <a:extLst>
               <a:ext uri="{FF2B5EF4-FFF2-40B4-BE49-F238E27FC236}">
-                <a16:creationId xmlns:a16="http://schemas.microsoft.com/office/drawing/2014/main" id="{0E6754AE-4E53-4DF1-90ED-6106394DE0B5}"/>
+                <a16:creationId xmlns:a16="http://schemas.microsoft.com/office/drawing/2014/main" id="{C30166F9-402E-42FC-83B2-B8C546174052}"/>
               </a:ext>
             </a:extLst>
           </p:cNvPr>
-          <p:cNvSpPr>
-            <a:spLocks noGrp="1"/>
-          </p:cNvSpPr>
-          <p:nvPr>
-            <p:ph idx="1"/>
-          </p:nvPr>
+          <p:cNvSpPr txBox="1">
+            <a:spLocks/>
+          </p:cNvSpPr>
+          <p:nvPr/>
         </p:nvSpPr>
         <p:spPr>
           <a:xfrm>
-            <a:off x="913795" y="1555576"/>
-            <a:ext cx="10353762" cy="4516915"/>
-          </a:xfrm>
-        </p:spPr>
-        <p:txBody>
-          <a:bodyPr>
+            <a:off x="856975" y="1346452"/>
+            <a:ext cx="10914082" cy="5307361"/>
+          </a:xfrm>
+          <a:prstGeom prst="rect">
+            <a:avLst/>
+          </a:prstGeom>
+          <a:effectLst>
+            <a:outerShdw blurRad="25400" dir="17880000">
+              <a:srgbClr val="000000">
+                <a:alpha val="46000"/>
+              </a:srgbClr>
+            </a:outerShdw>
+          </a:effectLst>
+        </p:spPr>
+        <p:txBody>
+          <a:bodyPr vert="horz" lIns="91440" tIns="45720" rIns="91440" bIns="45720" rtlCol="0" anchor="t">
             <a:normAutofit fontScale="92500" lnSpcReduction="20000"/>
           </a:bodyPr>
-          <a:lstStyle/>
-          <a:p>
-            <a:r>
-              <a:rPr lang="en-US" dirty="0"/>
-              <a:t>The number of accidents is directly related to the density of the populations, with more accidents happening in the most densely populated states. These accidents tend to be moderately severe in terms of impact on traffic.</a:t>
-            </a:r>
-          </a:p>
-          <a:p>
-            <a:r>
-              <a:rPr lang="en-US" dirty="0"/>
-              <a:t>Accidents tend to occur mostly during morning and evening rush hours with a notable peak in the number of accidents during those hours; for some cities with more traffic, this peak is more obvious. </a:t>
-            </a:r>
-          </a:p>
-          <a:p>
-            <a:r>
-              <a:rPr lang="en-US" dirty="0"/>
-              <a:t>Extreme weather could be causing approximately 13% of accidents in the US, although wet road accidents were not directly studied in this analysis.</a:t>
-            </a:r>
-          </a:p>
-          <a:p>
-            <a:r>
-              <a:rPr lang="en-US" dirty="0"/>
-              <a:t> This is further demonstrated by the correlation analysis, which shows a correlation between humidity and the number of accidents. </a:t>
-            </a:r>
-          </a:p>
-          <a:p>
-            <a:r>
-              <a:rPr lang="en-US" dirty="0"/>
-              <a:t>In general, human factors is a more likely cause of accidents as seen by our population density and time analyses, which lead us to conclude that the more cars are on the road, the more likely traffic accidents will occur. </a:t>
-            </a:r>
-          </a:p>
-        </p:txBody>
-      </p:sp>
+          <a:lstStyle>
+            <a:lvl1pPr marL="342900" indent="-306000" algn="l" defTabSz="457200" rtl="0" eaLnBrk="1" latinLnBrk="0" hangingPunct="1">
+              <a:lnSpc>
+                <a:spcPct val="110000"/>
+              </a:lnSpc>
+              <a:spcBef>
+                <a:spcPct val="20000"/>
+              </a:spcBef>
+              <a:spcAft>
+                <a:spcPts val="600"/>
+              </a:spcAft>
+              <a:buClr>
+                <a:schemeClr val="tx2"/>
+              </a:buClr>
+              <a:buSzPct val="70000"/>
+              <a:buFont typeface="Wingdings 2" charset="2"/>
+              <a:buChar char=""/>
+              <a:defRPr sz="2300" kern="1200">
+                <a:ln>
+                  <a:solidFill>
+                    <a:schemeClr val="bg1">
+                      <a:lumMod val="75000"/>
+                      <a:lumOff val="25000"/>
+                      <a:alpha val="10000"/>
+                    </a:schemeClr>
+                  </a:solidFill>
+                </a:ln>
+                <a:solidFill>
+                  <a:schemeClr val="tx2"/>
+                </a:solidFill>
+                <a:effectLst>
+                  <a:outerShdw blurRad="9525" dist="25400" dir="14640000" algn="tl" rotWithShape="0">
+                    <a:schemeClr val="bg1">
+                      <a:alpha val="30000"/>
+                    </a:schemeClr>
+                  </a:outerShdw>
+                </a:effectLst>
+                <a:latin typeface="+mn-lt"/>
+                <a:ea typeface="+mn-ea"/>
+                <a:cs typeface="+mn-cs"/>
+              </a:defRPr>
+            </a:lvl1pPr>
+            <a:lvl2pPr marL="720000" indent="-270000" algn="l" defTabSz="457200" rtl="0" eaLnBrk="1" latinLnBrk="0" hangingPunct="1">
+              <a:spcBef>
+                <a:spcPct val="20000"/>
+              </a:spcBef>
+              <a:spcAft>
+                <a:spcPts val="600"/>
+              </a:spcAft>
+              <a:buClr>
+                <a:schemeClr val="tx2"/>
+              </a:buClr>
+              <a:buSzPct val="70000"/>
+              <a:buFont typeface="Wingdings 2" charset="2"/>
+              <a:buChar char=""/>
+              <a:defRPr sz="2100" kern="1200">
+                <a:ln>
+                  <a:solidFill>
+                    <a:schemeClr val="bg1">
+                      <a:lumMod val="75000"/>
+                      <a:lumOff val="25000"/>
+                      <a:alpha val="10000"/>
+                    </a:schemeClr>
+                  </a:solidFill>
+                </a:ln>
+                <a:solidFill>
+                  <a:schemeClr val="tx2"/>
+                </a:solidFill>
+                <a:effectLst>
+                  <a:outerShdw blurRad="9525" dist="25400" dir="14640000" algn="tl" rotWithShape="0">
+                    <a:schemeClr val="bg1">
+                      <a:alpha val="30000"/>
+                    </a:schemeClr>
+                  </a:outerShdw>
+                </a:effectLst>
+                <a:latin typeface="+mn-lt"/>
+                <a:ea typeface="+mn-ea"/>
+                <a:cs typeface="+mn-cs"/>
+              </a:defRPr>
+            </a:lvl2pPr>
+            <a:lvl3pPr marL="1026000" indent="-216000" algn="l" defTabSz="457200" rtl="0" eaLnBrk="1" latinLnBrk="0" hangingPunct="1">
+              <a:spcBef>
+                <a:spcPct val="20000"/>
+              </a:spcBef>
+              <a:spcAft>
+                <a:spcPts val="600"/>
+              </a:spcAft>
+              <a:buClr>
+                <a:schemeClr val="tx2"/>
+              </a:buClr>
+              <a:buSzPct val="70000"/>
+              <a:buFont typeface="Wingdings 2" charset="2"/>
+              <a:buChar char=""/>
+              <a:defRPr sz="1800" kern="1200">
+                <a:ln>
+                  <a:solidFill>
+                    <a:schemeClr val="bg1">
+                      <a:lumMod val="75000"/>
+                      <a:lumOff val="25000"/>
+                      <a:alpha val="10000"/>
+                    </a:schemeClr>
+                  </a:solidFill>
+                </a:ln>
+                <a:solidFill>
+                  <a:schemeClr val="tx2"/>
+                </a:solidFill>
+                <a:effectLst>
+                  <a:outerShdw blurRad="9525" dist="25400" dir="14640000" algn="tl" rotWithShape="0">
+                    <a:schemeClr val="bg1">
+                      <a:alpha val="30000"/>
+                    </a:schemeClr>
+                  </a:outerShdw>
+                </a:effectLst>
+                <a:latin typeface="+mn-lt"/>
+                <a:ea typeface="+mn-ea"/>
+                <a:cs typeface="+mn-cs"/>
+              </a:defRPr>
+            </a:lvl3pPr>
+            <a:lvl4pPr marL="1386000" indent="-216000" algn="l" defTabSz="457200" rtl="0" eaLnBrk="1" latinLnBrk="0" hangingPunct="1">
+              <a:spcBef>
+                <a:spcPct val="20000"/>
+              </a:spcBef>
+              <a:spcAft>
+                <a:spcPts val="600"/>
+              </a:spcAft>
+              <a:buClr>
+                <a:schemeClr val="tx2"/>
+              </a:buClr>
+              <a:buSzPct val="70000"/>
+              <a:buFont typeface="Wingdings 2" charset="2"/>
+              <a:buChar char=""/>
+              <a:defRPr sz="1600" kern="1200">
+                <a:ln>
+                  <a:solidFill>
+                    <a:schemeClr val="bg1">
+                      <a:lumMod val="75000"/>
+                      <a:lumOff val="25000"/>
+                      <a:alpha val="10000"/>
+                    </a:schemeClr>
+                  </a:solidFill>
+                </a:ln>
+                <a:solidFill>
+                  <a:schemeClr val="tx2"/>
+                </a:solidFill>
+                <a:effectLst>
+                  <a:outerShdw blurRad="9525" dist="25400" dir="14640000" algn="tl" rotWithShape="0">
+                    <a:schemeClr val="bg1">
+                      <a:alpha val="30000"/>
+                    </a:schemeClr>
+                  </a:outerShdw>
+                </a:effectLst>
+                <a:latin typeface="+mn-lt"/>
+                <a:ea typeface="+mn-ea"/>
+                <a:cs typeface="+mn-cs"/>
+              </a:defRPr>
+            </a:lvl4pPr>
+            <a:lvl5pPr marL="1674000" indent="-216000" algn="l" defTabSz="457200" rtl="0" eaLnBrk="1" latinLnBrk="0" hangingPunct="1">
+              <a:spcBef>
+                <a:spcPct val="20000"/>
+              </a:spcBef>
+              <a:spcAft>
+                <a:spcPts val="600"/>
+              </a:spcAft>
+              <a:buClr>
+                <a:schemeClr val="tx2"/>
+              </a:buClr>
+              <a:buSzPct val="70000"/>
+              <a:buFont typeface="Wingdings 2" charset="2"/>
+              <a:buChar char=""/>
+              <a:defRPr sz="1600" kern="1200">
+                <a:ln>
+                  <a:solidFill>
+                    <a:schemeClr val="bg1">
+                      <a:lumMod val="75000"/>
+                      <a:lumOff val="25000"/>
+                      <a:alpha val="10000"/>
+                    </a:schemeClr>
+                  </a:solidFill>
+                </a:ln>
+                <a:solidFill>
+                  <a:schemeClr val="tx2"/>
+                </a:solidFill>
+                <a:effectLst>
+                  <a:outerShdw blurRad="9525" dist="25400" dir="14640000" algn="tl" rotWithShape="0">
+                    <a:schemeClr val="bg1">
+                      <a:alpha val="30000"/>
+                    </a:schemeClr>
+                  </a:outerShdw>
+                </a:effectLst>
+                <a:latin typeface="+mn-lt"/>
+                <a:ea typeface="+mn-ea"/>
+                <a:cs typeface="+mn-cs"/>
+              </a:defRPr>
+            </a:lvl5pPr>
+            <a:lvl6pPr marL="2014600" indent="-228600" algn="l" defTabSz="457200" rtl="0" eaLnBrk="1" latinLnBrk="0" hangingPunct="1">
+              <a:spcBef>
+                <a:spcPct val="20000"/>
+              </a:spcBef>
+              <a:spcAft>
+                <a:spcPts val="600"/>
+              </a:spcAft>
+              <a:buClr>
+                <a:schemeClr val="tx2"/>
+              </a:buClr>
+              <a:buSzPct val="70000"/>
+              <a:buFont typeface="Wingdings 2" charset="2"/>
+              <a:buChar char=""/>
+              <a:defRPr sz="1400" kern="1200">
+                <a:ln>
+                  <a:solidFill>
+                    <a:schemeClr val="bg1">
+                      <a:lumMod val="75000"/>
+                      <a:lumOff val="25000"/>
+                      <a:alpha val="10000"/>
+                    </a:schemeClr>
+                  </a:solidFill>
+                </a:ln>
+                <a:solidFill>
+                  <a:schemeClr val="tx2"/>
+                </a:solidFill>
+                <a:effectLst>
+                  <a:outerShdw blurRad="9525" dist="25400" dir="14640000" algn="tl" rotWithShape="0">
+                    <a:schemeClr val="bg1">
+                      <a:alpha val="30000"/>
+                    </a:schemeClr>
+                  </a:outerShdw>
+                </a:effectLst>
+                <a:latin typeface="+mn-lt"/>
+                <a:ea typeface="+mn-ea"/>
+                <a:cs typeface="+mn-cs"/>
+              </a:defRPr>
+            </a:lvl6pPr>
+            <a:lvl7pPr marL="2401800" indent="-228600" algn="l" defTabSz="457200" rtl="0" eaLnBrk="1" latinLnBrk="0" hangingPunct="1">
+              <a:spcBef>
+                <a:spcPct val="20000"/>
+              </a:spcBef>
+              <a:spcAft>
+                <a:spcPts val="600"/>
+              </a:spcAft>
+              <a:buClr>
+                <a:schemeClr val="tx2"/>
+              </a:buClr>
+              <a:buSzPct val="70000"/>
+              <a:buFont typeface="Wingdings 2" charset="2"/>
+              <a:buChar char=""/>
+              <a:defRPr sz="1400" kern="1200">
+                <a:ln>
+                  <a:solidFill>
+                    <a:schemeClr val="bg1">
+                      <a:lumMod val="75000"/>
+                      <a:lumOff val="25000"/>
+                      <a:alpha val="10000"/>
+                    </a:schemeClr>
+                  </a:solidFill>
+                </a:ln>
+                <a:solidFill>
+                  <a:schemeClr val="tx2"/>
+                </a:solidFill>
+                <a:effectLst>
+                  <a:outerShdw blurRad="9525" dist="25400" dir="14640000" algn="tl" rotWithShape="0">
+                    <a:schemeClr val="bg1">
+                      <a:alpha val="30000"/>
+                    </a:schemeClr>
+                  </a:outerShdw>
+                </a:effectLst>
+                <a:latin typeface="+mn-lt"/>
+                <a:ea typeface="+mn-ea"/>
+                <a:cs typeface="+mn-cs"/>
+              </a:defRPr>
+            </a:lvl7pPr>
+            <a:lvl8pPr marL="2789000" indent="-228600" algn="l" defTabSz="457200" rtl="0" eaLnBrk="1" latinLnBrk="0" hangingPunct="1">
+              <a:spcBef>
+                <a:spcPct val="20000"/>
+              </a:spcBef>
+              <a:spcAft>
+                <a:spcPts val="600"/>
+              </a:spcAft>
+              <a:buClr>
+                <a:schemeClr val="tx2"/>
+              </a:buClr>
+              <a:buSzPct val="70000"/>
+              <a:buFont typeface="Wingdings 2" charset="2"/>
+              <a:buChar char=""/>
+              <a:defRPr sz="1400" kern="1200">
+                <a:ln>
+                  <a:solidFill>
+                    <a:schemeClr val="bg1">
+                      <a:lumMod val="75000"/>
+                      <a:lumOff val="25000"/>
+                      <a:alpha val="10000"/>
+                    </a:schemeClr>
+                  </a:solidFill>
+                </a:ln>
+                <a:solidFill>
+                  <a:schemeClr val="tx2"/>
+                </a:solidFill>
+                <a:effectLst>
+                  <a:outerShdw blurRad="9525" dist="25400" dir="14640000" algn="tl" rotWithShape="0">
+                    <a:schemeClr val="bg1">
+                      <a:alpha val="30000"/>
+                    </a:schemeClr>
+                  </a:outerShdw>
+                </a:effectLst>
+                <a:latin typeface="+mn-lt"/>
+                <a:ea typeface="+mn-ea"/>
+                <a:cs typeface="+mn-cs"/>
+              </a:defRPr>
+            </a:lvl8pPr>
+            <a:lvl9pPr marL="3106200" indent="-228600" algn="l" defTabSz="457200" rtl="0" eaLnBrk="1" latinLnBrk="0" hangingPunct="1">
+              <a:spcBef>
+                <a:spcPct val="20000"/>
+              </a:spcBef>
+              <a:spcAft>
+                <a:spcPts val="600"/>
+              </a:spcAft>
+              <a:buClr>
+                <a:schemeClr val="tx2"/>
+              </a:buClr>
+              <a:buSzPct val="70000"/>
+              <a:buFont typeface="Wingdings 2" charset="2"/>
+              <a:buChar char=""/>
+              <a:defRPr sz="1400" kern="1200">
+                <a:ln>
+                  <a:solidFill>
+                    <a:schemeClr val="bg1">
+                      <a:lumMod val="75000"/>
+                      <a:lumOff val="25000"/>
+                      <a:alpha val="10000"/>
+                    </a:schemeClr>
+                  </a:solidFill>
+                </a:ln>
+                <a:solidFill>
+                  <a:schemeClr val="tx2"/>
+                </a:solidFill>
+                <a:effectLst>
+                  <a:outerShdw blurRad="9525" dist="25400" dir="14640000" algn="tl" rotWithShape="0">
+                    <a:schemeClr val="bg1">
+                      <a:alpha val="30000"/>
+                    </a:schemeClr>
+                  </a:outerShdw>
+                </a:effectLst>
+                <a:latin typeface="+mn-lt"/>
+                <a:ea typeface="+mn-ea"/>
+                <a:cs typeface="+mn-cs"/>
+              </a:defRPr>
+            </a:lvl9pPr>
+          </a:lstStyle>
+          <a:p>
+            <a:r>
+              <a:rPr lang="en-US" sz="1800" dirty="0"/>
+              <a:t>We combined some of the environmental factors and tried to analyze the correlation of accidents with the factors combined.</a:t>
+            </a:r>
+          </a:p>
+          <a:p>
+            <a:r>
+              <a:rPr lang="en-US" sz="1800" dirty="0"/>
+              <a:t>The methodology used to combine the factors was to multiply the values within each feature to calculate a combined score.</a:t>
+            </a:r>
+          </a:p>
+          <a:p>
+            <a:r>
+              <a:rPr lang="en-US" sz="1800" dirty="0"/>
+              <a:t>The correlation between the combined score and number of accidents was calculated using Pearson’s correlation co-efficient method.</a:t>
+            </a:r>
+          </a:p>
+          <a:p>
+            <a:endParaRPr lang="en-US" sz="1800" dirty="0"/>
+          </a:p>
+          <a:p>
+            <a:endParaRPr lang="en-US" sz="1800" dirty="0"/>
+          </a:p>
+          <a:p>
+            <a:endParaRPr lang="en-US" sz="1800" dirty="0"/>
+          </a:p>
+          <a:p>
+            <a:endParaRPr lang="en-US" sz="1800" dirty="0"/>
+          </a:p>
+          <a:p>
+            <a:endParaRPr lang="en-US" sz="1800" dirty="0"/>
+          </a:p>
+          <a:p>
+            <a:endParaRPr lang="en-US" sz="1800" dirty="0"/>
+          </a:p>
+          <a:p>
+            <a:endParaRPr lang="en-US" sz="1800" dirty="0"/>
+          </a:p>
+          <a:p>
+            <a:pPr marL="36900" indent="0">
+              <a:buNone/>
+            </a:pPr>
+            <a:r>
+              <a:rPr lang="en-US" sz="1800" dirty="0">
+                <a:solidFill>
+                  <a:srgbClr val="00B050"/>
+                </a:solidFill>
+              </a:rPr>
+              <a:t>No correlation was found in the factors that were combined with this methodology.</a:t>
+            </a:r>
+            <a:endParaRPr lang="en-US" sz="1800" dirty="0"/>
+          </a:p>
+          <a:p>
+            <a:pPr marL="36900" indent="0">
+              <a:buNone/>
+            </a:pPr>
+            <a:r>
+              <a:rPr lang="en-US" sz="1800" dirty="0">
+                <a:solidFill>
+                  <a:srgbClr val="00B050"/>
+                </a:solidFill>
+              </a:rPr>
+              <a:t>Different modelling methodologies and other factors can be combined to analyze and determine impact of </a:t>
+            </a:r>
+            <a:r>
+              <a:rPr lang="en-US" sz="1800">
+                <a:solidFill>
+                  <a:srgbClr val="00B050"/>
+                </a:solidFill>
+              </a:rPr>
+              <a:t>combination of </a:t>
+            </a:r>
+            <a:r>
+              <a:rPr lang="en-US" sz="1800" dirty="0">
+                <a:solidFill>
+                  <a:srgbClr val="00B050"/>
+                </a:solidFill>
+              </a:rPr>
+              <a:t>factors to number of accidents.</a:t>
+            </a:r>
+          </a:p>
+        </p:txBody>
+      </p:sp>
+      <p:graphicFrame>
+        <p:nvGraphicFramePr>
+          <p:cNvPr id="4" name="Table 4">
+            <a:extLst>
+              <a:ext uri="{FF2B5EF4-FFF2-40B4-BE49-F238E27FC236}">
+                <a16:creationId xmlns:a16="http://schemas.microsoft.com/office/drawing/2014/main" id="{20FDE4FA-E531-49DA-B1FD-AA336D57CB4C}"/>
+              </a:ext>
+            </a:extLst>
+          </p:cNvPr>
+          <p:cNvGraphicFramePr>
+            <a:graphicFrameLocks noGrp="1"/>
+          </p:cNvGraphicFramePr>
+          <p:nvPr>
+            <p:extLst>
+              <p:ext uri="{D42A27DB-BD31-4B8C-83A1-F6EECF244321}">
+                <p14:modId xmlns:p14="http://schemas.microsoft.com/office/powerpoint/2010/main" val="1136953010"/>
+              </p:ext>
+            </p:extLst>
+          </p:nvPr>
+        </p:nvGraphicFramePr>
+        <p:xfrm>
+          <a:off x="1056443" y="3352209"/>
+          <a:ext cx="9871969" cy="2057400"/>
+        </p:xfrm>
+        <a:graphic>
+          <a:graphicData uri="http://schemas.openxmlformats.org/drawingml/2006/table">
+            <a:tbl>
+              <a:tblPr firstRow="1" bandRow="1">
+                <a:tableStyleId>{5C22544A-7EE6-4342-B048-85BDC9FD1C3A}</a:tableStyleId>
+              </a:tblPr>
+              <a:tblGrid>
+                <a:gridCol w="1855433">
+                  <a:extLst>
+                    <a:ext uri="{9D8B030D-6E8A-4147-A177-3AD203B41FA5}">
+                      <a16:colId xmlns:a16="http://schemas.microsoft.com/office/drawing/2014/main" val="1625784068"/>
+                    </a:ext>
+                  </a:extLst>
+                </a:gridCol>
+                <a:gridCol w="2797941">
+                  <a:extLst>
+                    <a:ext uri="{9D8B030D-6E8A-4147-A177-3AD203B41FA5}">
+                      <a16:colId xmlns:a16="http://schemas.microsoft.com/office/drawing/2014/main" val="4189814391"/>
+                    </a:ext>
+                  </a:extLst>
+                </a:gridCol>
+                <a:gridCol w="2608560">
+                  <a:extLst>
+                    <a:ext uri="{9D8B030D-6E8A-4147-A177-3AD203B41FA5}">
+                      <a16:colId xmlns:a16="http://schemas.microsoft.com/office/drawing/2014/main" val="1428475437"/>
+                    </a:ext>
+                  </a:extLst>
+                </a:gridCol>
+                <a:gridCol w="2610035">
+                  <a:extLst>
+                    <a:ext uri="{9D8B030D-6E8A-4147-A177-3AD203B41FA5}">
+                      <a16:colId xmlns:a16="http://schemas.microsoft.com/office/drawing/2014/main" val="3487763787"/>
+                    </a:ext>
+                  </a:extLst>
+                </a:gridCol>
+              </a:tblGrid>
+              <a:tr h="0">
+                <a:tc>
+                  <a:txBody>
+                    <a:bodyPr/>
+                    <a:lstStyle/>
+                    <a:p>
+                      <a:endParaRPr lang="en-US" dirty="0">
+                        <a:solidFill>
+                          <a:srgbClr val="002060"/>
+                        </a:solidFill>
+                      </a:endParaRPr>
+                    </a:p>
+                  </a:txBody>
+                  <a:tcPr>
+                    <a:solidFill>
+                      <a:schemeClr val="tx1">
+                        <a:lumMod val="75000"/>
+                      </a:schemeClr>
+                    </a:solidFill>
+                  </a:tcPr>
+                </a:tc>
+                <a:tc>
+                  <a:txBody>
+                    <a:bodyPr/>
+                    <a:lstStyle/>
+                    <a:p>
+                      <a:r>
+                        <a:rPr lang="en-US" sz="1700" dirty="0">
+                          <a:solidFill>
+                            <a:srgbClr val="002060"/>
+                          </a:solidFill>
+                        </a:rPr>
+                        <a:t>First Factor Correlation </a:t>
+                      </a:r>
+                    </a:p>
+                    <a:p>
+                      <a:r>
+                        <a:rPr lang="en-US" sz="1700" dirty="0">
+                          <a:solidFill>
+                            <a:srgbClr val="002060"/>
+                          </a:solidFill>
+                        </a:rPr>
+                        <a:t>Co-efficient</a:t>
+                      </a:r>
+                      <a:endParaRPr lang="en-US" sz="1700" dirty="0"/>
+                    </a:p>
+                  </a:txBody>
+                  <a:tcPr>
+                    <a:solidFill>
+                      <a:schemeClr val="tx1">
+                        <a:lumMod val="75000"/>
+                      </a:schemeClr>
+                    </a:solidFill>
+                  </a:tcPr>
+                </a:tc>
+                <a:tc>
+                  <a:txBody>
+                    <a:bodyPr/>
+                    <a:lstStyle/>
+                    <a:p>
+                      <a:pPr marL="0" marR="0" lvl="0" indent="0" algn="l" defTabSz="457200" rtl="0" eaLnBrk="1" fontAlgn="auto" latinLnBrk="0" hangingPunct="1">
+                        <a:lnSpc>
+                          <a:spcPct val="100000"/>
+                        </a:lnSpc>
+                        <a:spcBef>
+                          <a:spcPts val="0"/>
+                        </a:spcBef>
+                        <a:spcAft>
+                          <a:spcPts val="0"/>
+                        </a:spcAft>
+                        <a:buClrTx/>
+                        <a:buSzTx/>
+                        <a:buFontTx/>
+                        <a:buNone/>
+                        <a:tabLst/>
+                        <a:defRPr/>
+                      </a:pPr>
+                      <a:r>
+                        <a:rPr lang="en-US" sz="1700" dirty="0">
+                          <a:solidFill>
+                            <a:srgbClr val="002060"/>
+                          </a:solidFill>
+                        </a:rPr>
+                        <a:t>Second Factor Correlation Co-efficient</a:t>
+                      </a:r>
+                      <a:endParaRPr lang="en-US" sz="1700" dirty="0"/>
+                    </a:p>
+                    <a:p>
+                      <a:endParaRPr lang="en-US" sz="1700" dirty="0"/>
+                    </a:p>
+                  </a:txBody>
+                  <a:tcPr>
+                    <a:solidFill>
+                      <a:schemeClr val="tx1">
+                        <a:lumMod val="75000"/>
+                      </a:schemeClr>
+                    </a:solidFill>
+                  </a:tcPr>
+                </a:tc>
+                <a:tc>
+                  <a:txBody>
+                    <a:bodyPr/>
+                    <a:lstStyle/>
+                    <a:p>
+                      <a:pPr marL="0" marR="0" lvl="0" indent="0" algn="l" defTabSz="457200" rtl="0" eaLnBrk="1" fontAlgn="auto" latinLnBrk="0" hangingPunct="1">
+                        <a:lnSpc>
+                          <a:spcPct val="100000"/>
+                        </a:lnSpc>
+                        <a:spcBef>
+                          <a:spcPts val="0"/>
+                        </a:spcBef>
+                        <a:spcAft>
+                          <a:spcPts val="0"/>
+                        </a:spcAft>
+                        <a:buClrTx/>
+                        <a:buSzTx/>
+                        <a:buFontTx/>
+                        <a:buNone/>
+                        <a:tabLst/>
+                        <a:defRPr/>
+                      </a:pPr>
+                      <a:r>
+                        <a:rPr lang="en-US" sz="1700" dirty="0">
+                          <a:solidFill>
+                            <a:srgbClr val="002060"/>
+                          </a:solidFill>
+                        </a:rPr>
+                        <a:t>Combined Correlation Co-efficient</a:t>
+                      </a:r>
+                      <a:endParaRPr lang="en-US" sz="1700" dirty="0"/>
+                    </a:p>
+                    <a:p>
+                      <a:endParaRPr lang="en-US" sz="1700" dirty="0"/>
+                    </a:p>
+                  </a:txBody>
+                  <a:tcPr>
+                    <a:solidFill>
+                      <a:schemeClr val="tx1">
+                        <a:lumMod val="75000"/>
+                      </a:schemeClr>
+                    </a:solidFill>
+                  </a:tcPr>
+                </a:tc>
+                <a:extLst>
+                  <a:ext uri="{0D108BD9-81ED-4DB2-BD59-A6C34878D82A}">
+                    <a16:rowId xmlns:a16="http://schemas.microsoft.com/office/drawing/2014/main" val="655923600"/>
+                  </a:ext>
+                </a:extLst>
+              </a:tr>
+              <a:tr h="370840">
+                <a:tc>
+                  <a:txBody>
+                    <a:bodyPr/>
+                    <a:lstStyle/>
+                    <a:p>
+                      <a:r>
+                        <a:rPr lang="en-US" sz="1600" dirty="0">
+                          <a:solidFill>
+                            <a:srgbClr val="002060"/>
+                          </a:solidFill>
+                        </a:rPr>
+                        <a:t>Temperature </a:t>
+                      </a:r>
+                    </a:p>
+                    <a:p>
+                      <a:r>
+                        <a:rPr lang="en-US" sz="1600" dirty="0">
+                          <a:solidFill>
+                            <a:srgbClr val="002060"/>
+                          </a:solidFill>
+                        </a:rPr>
+                        <a:t>and Visibility</a:t>
+                      </a:r>
+                      <a:endParaRPr lang="en-US" sz="1600" dirty="0"/>
+                    </a:p>
+                  </a:txBody>
+                  <a:tcPr/>
+                </a:tc>
+                <a:tc>
+                  <a:txBody>
+                    <a:bodyPr/>
+                    <a:lstStyle/>
+                    <a:p>
+                      <a:r>
+                        <a:rPr lang="en-US" sz="1700" dirty="0"/>
+                        <a:t>0.1402</a:t>
+                      </a:r>
+                    </a:p>
+                  </a:txBody>
+                  <a:tcPr/>
+                </a:tc>
+                <a:tc>
+                  <a:txBody>
+                    <a:bodyPr/>
+                    <a:lstStyle/>
+                    <a:p>
+                      <a:r>
+                        <a:rPr lang="en-US" sz="1700" dirty="0"/>
+                        <a:t>-0.2266</a:t>
+                      </a:r>
+                    </a:p>
+                  </a:txBody>
+                  <a:tcPr/>
+                </a:tc>
+                <a:tc>
+                  <a:txBody>
+                    <a:bodyPr/>
+                    <a:lstStyle/>
+                    <a:p>
+                      <a:r>
+                        <a:rPr lang="en-US" sz="1700" dirty="0"/>
+                        <a:t>-0.0214</a:t>
+                      </a:r>
+                    </a:p>
+                  </a:txBody>
+                  <a:tcPr/>
+                </a:tc>
+                <a:extLst>
+                  <a:ext uri="{0D108BD9-81ED-4DB2-BD59-A6C34878D82A}">
+                    <a16:rowId xmlns:a16="http://schemas.microsoft.com/office/drawing/2014/main" val="4119394677"/>
+                  </a:ext>
+                </a:extLst>
+              </a:tr>
+              <a:tr h="370840">
+                <a:tc>
+                  <a:txBody>
+                    <a:bodyPr/>
+                    <a:lstStyle/>
+                    <a:p>
+                      <a:r>
+                        <a:rPr lang="en-US" sz="1600" dirty="0">
+                          <a:solidFill>
+                            <a:srgbClr val="002060"/>
+                          </a:solidFill>
+                        </a:rPr>
+                        <a:t>Humidity </a:t>
+                      </a:r>
+                    </a:p>
+                    <a:p>
+                      <a:r>
+                        <a:rPr lang="en-US" sz="1600" dirty="0">
+                          <a:solidFill>
+                            <a:srgbClr val="002060"/>
+                          </a:solidFill>
+                        </a:rPr>
+                        <a:t>and Visibility</a:t>
+                      </a:r>
+                      <a:endParaRPr lang="en-US" sz="1600" dirty="0"/>
+                    </a:p>
+                  </a:txBody>
+                  <a:tcPr/>
+                </a:tc>
+                <a:tc>
+                  <a:txBody>
+                    <a:bodyPr/>
+                    <a:lstStyle/>
+                    <a:p>
+                      <a:r>
+                        <a:rPr lang="en-US" sz="1700" dirty="0"/>
+                        <a:t>0.7222</a:t>
+                      </a:r>
+                    </a:p>
+                  </a:txBody>
+                  <a:tcPr/>
+                </a:tc>
+                <a:tc>
+                  <a:txBody>
+                    <a:bodyPr/>
+                    <a:lstStyle/>
+                    <a:p>
+                      <a:pPr marL="0" marR="0" lvl="0" indent="0" algn="l" defTabSz="457200" rtl="0" eaLnBrk="1" fontAlgn="auto" latinLnBrk="0" hangingPunct="1">
+                        <a:lnSpc>
+                          <a:spcPct val="100000"/>
+                        </a:lnSpc>
+                        <a:spcBef>
+                          <a:spcPts val="0"/>
+                        </a:spcBef>
+                        <a:spcAft>
+                          <a:spcPts val="0"/>
+                        </a:spcAft>
+                        <a:buClrTx/>
+                        <a:buSzTx/>
+                        <a:buFontTx/>
+                        <a:buNone/>
+                        <a:tabLst/>
+                        <a:defRPr/>
+                      </a:pPr>
+                      <a:r>
+                        <a:rPr lang="en-US" sz="1700" dirty="0"/>
+                        <a:t>-0.2266</a:t>
+                      </a:r>
+                    </a:p>
+                    <a:p>
+                      <a:endParaRPr lang="en-US" sz="1700" dirty="0"/>
+                    </a:p>
+                  </a:txBody>
+                  <a:tcPr/>
+                </a:tc>
+                <a:tc>
+                  <a:txBody>
+                    <a:bodyPr/>
+                    <a:lstStyle/>
+                    <a:p>
+                      <a:r>
+                        <a:rPr lang="en-US" sz="1700" dirty="0"/>
+                        <a:t>-0.0667</a:t>
+                      </a:r>
+                    </a:p>
+                  </a:txBody>
+                  <a:tcPr/>
+                </a:tc>
+                <a:extLst>
+                  <a:ext uri="{0D108BD9-81ED-4DB2-BD59-A6C34878D82A}">
+                    <a16:rowId xmlns:a16="http://schemas.microsoft.com/office/drawing/2014/main" val="2539530736"/>
+                  </a:ext>
+                </a:extLst>
+              </a:tr>
+            </a:tbl>
+          </a:graphicData>
+        </a:graphic>
+      </p:graphicFrame>
     </p:spTree>
     <p:extLst>
       <p:ext uri="{BB962C8B-B14F-4D97-AF65-F5344CB8AC3E}">
-        <p14:creationId xmlns:p14="http://schemas.microsoft.com/office/powerpoint/2010/main" val="47369582"/>
+        <p14:creationId xmlns:p14="http://schemas.microsoft.com/office/powerpoint/2010/main" val="4042520814"/>
       </p:ext>
     </p:extLst>
   </p:cSld>
@@ -8150,6 +9305,128 @@
           <p:cNvPr id="2" name="Title 1">
             <a:extLst>
               <a:ext uri="{FF2B5EF4-FFF2-40B4-BE49-F238E27FC236}">
+                <a16:creationId xmlns:a16="http://schemas.microsoft.com/office/drawing/2014/main" id="{F84ECC37-3C78-7046-A8E3-78CB68461166}"/>
+              </a:ext>
+            </a:extLst>
+          </p:cNvPr>
+          <p:cNvSpPr>
+            <a:spLocks noGrp="1"/>
+          </p:cNvSpPr>
+          <p:nvPr>
+            <p:ph type="title"/>
+          </p:nvPr>
+        </p:nvSpPr>
+        <p:spPr>
+          <a:xfrm>
+            <a:off x="913795" y="298276"/>
+            <a:ext cx="10353762" cy="1257300"/>
+          </a:xfrm>
+        </p:spPr>
+        <p:txBody>
+          <a:bodyPr/>
+          <a:lstStyle/>
+          <a:p>
+            <a:r>
+              <a:rPr lang="en-US" dirty="0"/>
+              <a:t>Conclusions</a:t>
+            </a:r>
+          </a:p>
+        </p:txBody>
+      </p:sp>
+      <p:sp>
+        <p:nvSpPr>
+          <p:cNvPr id="4" name="Content Placeholder 3">
+            <a:extLst>
+              <a:ext uri="{FF2B5EF4-FFF2-40B4-BE49-F238E27FC236}">
+                <a16:creationId xmlns:a16="http://schemas.microsoft.com/office/drawing/2014/main" id="{0E6754AE-4E53-4DF1-90ED-6106394DE0B5}"/>
+              </a:ext>
+            </a:extLst>
+          </p:cNvPr>
+          <p:cNvSpPr>
+            <a:spLocks noGrp="1"/>
+          </p:cNvSpPr>
+          <p:nvPr>
+            <p:ph idx="1"/>
+          </p:nvPr>
+        </p:nvSpPr>
+        <p:spPr>
+          <a:xfrm>
+            <a:off x="913795" y="1555576"/>
+            <a:ext cx="10353762" cy="4516915"/>
+          </a:xfrm>
+        </p:spPr>
+        <p:txBody>
+          <a:bodyPr>
+            <a:normAutofit fontScale="92500" lnSpcReduction="20000"/>
+          </a:bodyPr>
+          <a:lstStyle/>
+          <a:p>
+            <a:r>
+              <a:rPr lang="en-US" dirty="0"/>
+              <a:t>The number of accidents is directly related to the density of the populations, with more accidents happening in the most densely populated states. These accidents tend to be moderately severe in terms of impact on traffic.</a:t>
+            </a:r>
+          </a:p>
+          <a:p>
+            <a:r>
+              <a:rPr lang="en-US" dirty="0"/>
+              <a:t>Accidents tend to occur mostly during morning and evening rush hours with a notable peak in the number of accidents during those hours; for some cities with more traffic, this peak is more obvious. </a:t>
+            </a:r>
+          </a:p>
+          <a:p>
+            <a:r>
+              <a:rPr lang="en-US" dirty="0"/>
+              <a:t>Extreme weather could be causing approximately 13% of accidents in the US, although wet road accidents were not directly studied in this analysis.</a:t>
+            </a:r>
+          </a:p>
+          <a:p>
+            <a:r>
+              <a:rPr lang="en-US" dirty="0"/>
+              <a:t> This is further demonstrated by the correlation analysis, which shows a correlation between humidity and the number of accidents. </a:t>
+            </a:r>
+          </a:p>
+          <a:p>
+            <a:r>
+              <a:rPr lang="en-US" dirty="0"/>
+              <a:t>In general, human factors is a more likely cause of accidents as seen by our population density and time analyses, which lead us to conclude that the more cars are on the road, the more likely traffic accidents will occur. </a:t>
+            </a:r>
+          </a:p>
+        </p:txBody>
+      </p:sp>
+    </p:spTree>
+    <p:extLst>
+      <p:ext uri="{BB962C8B-B14F-4D97-AF65-F5344CB8AC3E}">
+        <p14:creationId xmlns:p14="http://schemas.microsoft.com/office/powerpoint/2010/main" val="47369582"/>
+      </p:ext>
+    </p:extLst>
+  </p:cSld>
+  <p:clrMapOvr>
+    <a:masterClrMapping/>
+  </p:clrMapOvr>
+</p:sld>
+</file>
+
+<file path=ppt/slides/slide16.xml><?xml version="1.0" encoding="utf-8"?>
+<p:sld xmlns:a="http://schemas.openxmlformats.org/drawingml/2006/main" xmlns:r="http://schemas.openxmlformats.org/officeDocument/2006/relationships" xmlns:p="http://schemas.openxmlformats.org/presentationml/2006/main">
+  <p:cSld>
+    <p:spTree>
+      <p:nvGrpSpPr>
+        <p:cNvPr id="1" name=""/>
+        <p:cNvGrpSpPr/>
+        <p:nvPr/>
+      </p:nvGrpSpPr>
+      <p:grpSpPr>
+        <a:xfrm>
+          <a:off x="0" y="0"/>
+          <a:ext cx="0" cy="0"/>
+          <a:chOff x="0" y="0"/>
+          <a:chExt cx="0" cy="0"/>
+        </a:xfrm>
+      </p:grpSpPr>
+      <p:sp>
+        <p:nvSpPr>
+          <p:cNvPr id="2" name="Title 1">
+            <a:extLst>
+              <a:ext uri="{FF2B5EF4-FFF2-40B4-BE49-F238E27FC236}">
                 <a16:creationId xmlns:a16="http://schemas.microsoft.com/office/drawing/2014/main" id="{73E526B1-E318-4340-B978-9A431491E9CF}"/>
               </a:ext>
             </a:extLst>
@@ -8202,7 +9479,7 @@
         </p:spPr>
         <p:txBody>
           <a:bodyPr>
-            <a:normAutofit lnSpcReduction="10000"/>
+            <a:normAutofit fontScale="92500" lnSpcReduction="20000"/>
           </a:bodyPr>
           <a:lstStyle/>
           <a:p>
@@ -8214,13 +9491,13 @@
           <a:p>
             <a:r>
               <a:rPr lang="en-US" sz="2800" dirty="0"/>
-              <a:t>Look further into states with least accidents to analyze cause of accidents.</a:t>
+              <a:t>Look further into states with lesser number of accidents to analyze impact of weather conditions to accidents.</a:t>
             </a:r>
           </a:p>
           <a:p>
             <a:r>
               <a:rPr lang="en-US" sz="2800" dirty="0"/>
-              <a:t>More analysis on multiple or cumulative factors on accidents.</a:t>
+              <a:t>More models can be designed and applied to analyze cumulative impact of multiple factors on accidents.</a:t>
             </a:r>
           </a:p>
           <a:p>
@@ -8232,7 +9509,7 @@
           <a:p>
             <a:r>
               <a:rPr lang="en-US" sz="2800" dirty="0"/>
-              <a:t>Look into severity level of accidents as it relates to length of impact on traffic.</a:t>
+              <a:t>Look into relation of severity level of accidents to length of impact on traffic.</a:t>
             </a:r>
           </a:p>
           <a:p>
@@ -10313,15 +11590,6 @@
 </file>
 
 <file path=customXml/item1.xml><?xml version="1.0" encoding="utf-8"?>
-<?mso-contentType ?>
-<FormTemplates xmlns="http://schemas.microsoft.com/sharepoint/v3/contenttype/forms">
-  <Display>DocumentLibraryForm</Display>
-  <Edit>DocumentLibraryForm</Edit>
-  <New>DocumentLibraryForm</New>
-</FormTemplates>
-</file>
-
-<file path=customXml/item2.xml><?xml version="1.0" encoding="utf-8"?>
 <ct:contentTypeSchema xmlns:ct="http://schemas.microsoft.com/office/2006/metadata/contentType" xmlns:ma="http://schemas.microsoft.com/office/2006/metadata/properties/metaAttributes" ct:_="" ma:_="" ma:contentTypeName="Document" ma:contentTypeID="0x01010079F111ED35F8CC479449609E8A0923A6" ma:contentTypeVersion="12" ma:contentTypeDescription="Create a new document." ma:contentTypeScope="" ma:versionID="a410dd7f93c95333ffa1b60ed6adedd1">
   <xsd:schema xmlns:xsd="http://www.w3.org/2001/XMLSchema" xmlns:xs="http://www.w3.org/2001/XMLSchema" xmlns:p="http://schemas.microsoft.com/office/2006/metadata/properties" xmlns:ns2="71af3243-3dd4-4a8d-8c0d-dd76da1f02a5" xmlns:ns3="16c05727-aa75-4e4a-9b5f-8a80a1165891" targetNamespace="http://schemas.microsoft.com/office/2006/metadata/properties" ma:root="true" ma:fieldsID="a936d9baba76aa3866493feff160faab" ns2:_="" ns3:_="">
     <xsd:import namespace="71af3243-3dd4-4a8d-8c0d-dd76da1f02a5"/>
@@ -10542,6 +11810,15 @@
 </ct:contentTypeSchema>
 </file>
 
+<file path=customXml/item2.xml><?xml version="1.0" encoding="utf-8"?>
+<?mso-contentType ?>
+<FormTemplates xmlns="http://schemas.microsoft.com/sharepoint/v3/contenttype/forms">
+  <Display>DocumentLibraryForm</Display>
+  <Edit>DocumentLibraryForm</Edit>
+  <New>DocumentLibraryForm</New>
+</FormTemplates>
+</file>
+
 <file path=customXml/item3.xml><?xml version="1.0" encoding="utf-8"?>
 <p:properties xmlns:p="http://schemas.microsoft.com/office/2006/metadata/properties" xmlns:xsi="http://www.w3.org/2001/XMLSchema-instance" xmlns:pc="http://schemas.microsoft.com/office/infopath/2007/PartnerControls">
   <documentManagement>
@@ -10552,14 +11829,6 @@
 </file>
 
 <file path=customXml/itemProps1.xml><?xml version="1.0" encoding="utf-8"?>
-<ds:datastoreItem xmlns:ds="http://schemas.openxmlformats.org/officeDocument/2006/customXml" ds:itemID="{64B270AB-C138-415C-897E-3C24487DECF1}">
-  <ds:schemaRefs>
-    <ds:schemaRef ds:uri="http://schemas.microsoft.com/sharepoint/v3/contenttype/forms"/>
-  </ds:schemaRefs>
-</ds:datastoreItem>
-</file>
-
-<file path=customXml/itemProps2.xml><?xml version="1.0" encoding="utf-8"?>
 <ds:datastoreItem xmlns:ds="http://schemas.openxmlformats.org/officeDocument/2006/customXml" ds:itemID="{0585E981-8C91-4205-A0C3-C991F42B4C9E}">
   <ds:schemaRefs>
     <ds:schemaRef ds:uri="http://schemas.microsoft.com/office/2006/metadata/contentType"/>
@@ -10578,6 +11847,14 @@
 </ds:datastoreItem>
 </file>
 
+<file path=customXml/itemProps2.xml><?xml version="1.0" encoding="utf-8"?>
+<ds:datastoreItem xmlns:ds="http://schemas.openxmlformats.org/officeDocument/2006/customXml" ds:itemID="{64B270AB-C138-415C-897E-3C24487DECF1}">
+  <ds:schemaRefs>
+    <ds:schemaRef ds:uri="http://schemas.microsoft.com/sharepoint/v3/contenttype/forms"/>
+  </ds:schemaRefs>
+</ds:datastoreItem>
+</file>
+
 <file path=customXml/itemProps3.xml><?xml version="1.0" encoding="utf-8"?>
 <ds:datastoreItem xmlns:ds="http://schemas.openxmlformats.org/officeDocument/2006/customXml" ds:itemID="{2C4C00F4-06E9-43E3-AD97-88A857CEFA82}">
   <ds:schemaRefs>

</xml_diff>

<commit_message>
added the links to the dataframe to ppt and notebook
</commit_message>
<xml_diff>
--- a/US Accidents Analysis_Group.pptx
+++ b/US Accidents Analysis_Group.pptx
@@ -5,7 +5,7 @@
     <p:sldMasterId id="2147483660" r:id="rId4"/>
   </p:sldMasterIdLst>
   <p:notesMasterIdLst>
-    <p:notesMasterId r:id="rId21"/>
+    <p:notesMasterId r:id="rId22"/>
   </p:notesMasterIdLst>
   <p:sldIdLst>
     <p:sldId id="278" r:id="rId5"/>
@@ -14,8 +14,8 @@
     <p:sldId id="281" r:id="rId8"/>
     <p:sldId id="282" r:id="rId9"/>
     <p:sldId id="284" r:id="rId10"/>
-    <p:sldId id="293" r:id="rId11"/>
-    <p:sldId id="283" r:id="rId12"/>
+    <p:sldId id="283" r:id="rId11"/>
+    <p:sldId id="293" r:id="rId12"/>
     <p:sldId id="286" r:id="rId13"/>
     <p:sldId id="289" r:id="rId14"/>
     <p:sldId id="292" r:id="rId15"/>
@@ -24,6 +24,7 @@
     <p:sldId id="297" r:id="rId18"/>
     <p:sldId id="288" r:id="rId19"/>
     <p:sldId id="294" r:id="rId20"/>
+    <p:sldId id="298" r:id="rId21"/>
   </p:sldIdLst>
   <p:sldSz cx="12192000" cy="6858000"/>
   <p:notesSz cx="6858000" cy="9144000"/>
@@ -212,7 +213,7 @@
           <a:p>
             <a:fld id="{AFD01546-198A-4195-BCF8-F0FF54C90E5E}" type="datetimeFigureOut">
               <a:rPr lang="en-US" smtClean="0"/>
-              <a:t>6/29/2020</a:t>
+              <a:t>6/30/2020</a:t>
             </a:fld>
             <a:endParaRPr lang="en-US" dirty="0"/>
           </a:p>
@@ -892,7 +893,7 @@
           <a:p>
             <a:fld id="{88D38747-4367-4BD2-8D51-C97E202738E2}" type="datetime1">
               <a:rPr lang="en-US" smtClean="0"/>
-              <a:t>6/29/2020</a:t>
+              <a:t>6/30/2020</a:t>
             </a:fld>
             <a:endParaRPr lang="en-US" dirty="0"/>
           </a:p>
@@ -1197,7 +1198,7 @@
           <a:p>
             <a:fld id="{11F1B079-7EF0-44EE-B798-BCC497C9F3B2}" type="datetime1">
               <a:rPr lang="en-US" smtClean="0"/>
-              <a:t>6/29/2020</a:t>
+              <a:t>6/30/2020</a:t>
             </a:fld>
             <a:endParaRPr lang="en-US" dirty="0"/>
           </a:p>
@@ -1391,7 +1392,7 @@
           <a:p>
             <a:fld id="{28FF70A8-1D13-4657-95F0-A9EA54967B8D}" type="datetime1">
               <a:rPr lang="en-US" smtClean="0"/>
-              <a:t>6/29/2020</a:t>
+              <a:t>6/30/2020</a:t>
             </a:fld>
             <a:endParaRPr lang="en-US" dirty="0"/>
           </a:p>
@@ -1654,7 +1655,7 @@
           <a:p>
             <a:fld id="{21EB90AC-71BD-4C7F-8ACA-7B3F18292E63}" type="datetime1">
               <a:rPr lang="en-US" smtClean="0"/>
-              <a:t>6/29/2020</a:t>
+              <a:t>6/30/2020</a:t>
             </a:fld>
             <a:endParaRPr lang="en-US" dirty="0"/>
           </a:p>
@@ -2090,7 +2091,7 @@
           <a:p>
             <a:fld id="{4E6EFC2C-8905-46F0-B443-CE905B76BA01}" type="datetime1">
               <a:rPr lang="en-US" smtClean="0"/>
-              <a:t>6/29/2020</a:t>
+              <a:t>6/30/2020</a:t>
             </a:fld>
             <a:endParaRPr lang="en-US" dirty="0"/>
           </a:p>
@@ -2627,7 +2628,7 @@
           <a:p>
             <a:fld id="{D9079DC3-C9B5-499E-9140-0DC28B7074E2}" type="datetime1">
               <a:rPr lang="en-US" smtClean="0"/>
-              <a:t>6/29/2020</a:t>
+              <a:t>6/30/2020</a:t>
             </a:fld>
             <a:endParaRPr lang="en-US" dirty="0"/>
           </a:p>
@@ -3509,7 +3510,7 @@
           <a:p>
             <a:fld id="{30BB33EA-E472-4D22-9C03-A9C14AA21CED}" type="datetime1">
               <a:rPr lang="en-US" smtClean="0"/>
-              <a:t>6/29/2020</a:t>
+              <a:t>6/30/2020</a:t>
             </a:fld>
             <a:endParaRPr lang="en-US" dirty="0"/>
           </a:p>
@@ -3679,7 +3680,7 @@
           <a:p>
             <a:fld id="{73C55A3C-5767-4844-A0A3-83778C2E5409}" type="datetime1">
               <a:rPr lang="en-US" smtClean="0"/>
-              <a:t>6/29/2020</a:t>
+              <a:t>6/30/2020</a:t>
             </a:fld>
             <a:endParaRPr lang="en-US" dirty="0"/>
           </a:p>
@@ -3923,7 +3924,7 @@
           <a:p>
             <a:fld id="{CAE507A8-A5CF-4D38-AB86-7EDDA87A85D4}" type="datetime1">
               <a:rPr lang="en-US" smtClean="0"/>
-              <a:t>6/29/2020</a:t>
+              <a:t>6/30/2020</a:t>
             </a:fld>
             <a:endParaRPr lang="en-US" dirty="0"/>
           </a:p>
@@ -4165,7 +4166,7 @@
           <a:p>
             <a:fld id="{BDFCD27C-8599-43EF-BA1D-14DDC1946E06}" type="datetime1">
               <a:rPr lang="en-US" smtClean="0"/>
-              <a:t>6/29/2020</a:t>
+              <a:t>6/30/2020</a:t>
             </a:fld>
             <a:endParaRPr lang="en-US" dirty="0"/>
           </a:p>
@@ -4648,7 +4649,7 @@
           <a:p>
             <a:fld id="{49343D99-809A-49C0-96E5-4250D0B498EE}" type="datetime1">
               <a:rPr lang="en-US" smtClean="0"/>
-              <a:t>6/29/2020</a:t>
+              <a:t>6/30/2020</a:t>
             </a:fld>
             <a:endParaRPr lang="en-US" dirty="0"/>
           </a:p>
@@ -4766,7 +4767,7 @@
           <a:p>
             <a:fld id="{A143DE9B-B678-4EFB-BB7D-A4370204A0B0}" type="datetime1">
               <a:rPr lang="en-US" smtClean="0"/>
-              <a:t>6/29/2020</a:t>
+              <a:t>6/30/2020</a:t>
             </a:fld>
             <a:endParaRPr lang="en-US" dirty="0"/>
           </a:p>
@@ -4861,7 +4862,7 @@
           <a:p>
             <a:fld id="{E68812DA-F765-4142-A6A3-A8ED7235E082}" type="datetime1">
               <a:rPr lang="en-US" smtClean="0"/>
-              <a:t>6/29/2020</a:t>
+              <a:t>6/30/2020</a:t>
             </a:fld>
             <a:endParaRPr lang="en-US" dirty="0"/>
           </a:p>
@@ -5116,7 +5117,7 @@
           <a:p>
             <a:fld id="{3E0277FD-7DE6-41D4-930D-AC99F5AFE54E}" type="datetime1">
               <a:rPr lang="en-US" smtClean="0"/>
-              <a:t>6/29/2020</a:t>
+              <a:t>6/30/2020</a:t>
             </a:fld>
             <a:endParaRPr lang="en-US" dirty="0"/>
           </a:p>
@@ -5423,7 +5424,7 @@
           <a:p>
             <a:fld id="{9EA15526-7079-4B7B-987C-1B5FAE11A0FF}" type="datetime1">
               <a:rPr lang="en-US" smtClean="0"/>
-              <a:t>6/29/2020</a:t>
+              <a:t>6/30/2020</a:t>
             </a:fld>
             <a:endParaRPr lang="en-US" dirty="0"/>
           </a:p>
@@ -5658,7 +5659,7 @@
           <a:p>
             <a:fld id="{073ED0CC-082F-4160-86E5-0D6041F12778}" type="datetime1">
               <a:rPr lang="en-US" smtClean="0"/>
-              <a:t>6/29/2020</a:t>
+              <a:t>6/30/2020</a:t>
             </a:fld>
             <a:endParaRPr lang="en-US" dirty="0"/>
           </a:p>
@@ -6660,7 +6661,7 @@
             <a:pPr algn="l"/>
             <a:r>
               <a:rPr lang="en-US" sz="4000" dirty="0"/>
-              <a:t>Analysis of US Traffic Accidents from Dec 2016 – Dec 2019</a:t>
+              <a:t>Analysis of US Traffic Accidents, from Dec 2016 – Dec 2019</a:t>
             </a:r>
           </a:p>
         </p:txBody>
@@ -6808,8 +6809,8 @@
         </p:blipFill>
         <p:spPr>
           <a:xfrm>
-            <a:off x="1078310" y="2076450"/>
-            <a:ext cx="4528343" cy="3622675"/>
+            <a:off x="720214" y="2000249"/>
+            <a:ext cx="5446258" cy="4357007"/>
           </a:xfrm>
         </p:spPr>
       </p:pic>
@@ -7040,68 +7041,6 @@
           <a:xfrm>
             <a:off x="7232905" y="1"/>
             <a:ext cx="4959095" cy="6858000"/>
-          </a:xfrm>
-          <a:prstGeom prst="rect">
-            <a:avLst/>
-          </a:prstGeom>
-        </p:spPr>
-      </p:pic>
-      <p:pic>
-        <p:nvPicPr>
-          <p:cNvPr id="13" name="Content Placeholder 12" descr="A close up of a map&#10;&#10;Description automatically generated">
-            <a:extLst>
-              <a:ext uri="{FF2B5EF4-FFF2-40B4-BE49-F238E27FC236}">
-                <a16:creationId xmlns:a16="http://schemas.microsoft.com/office/drawing/2014/main" id="{C3818F8F-5A85-45EA-971C-94664FAE7862}"/>
-              </a:ext>
-            </a:extLst>
-          </p:cNvPr>
-          <p:cNvPicPr>
-            <a:picLocks noGrp="1" noChangeAspect="1"/>
-          </p:cNvPicPr>
-          <p:nvPr>
-            <p:ph sz="half" idx="1"/>
-          </p:nvPr>
-        </p:nvPicPr>
-        <p:blipFill rotWithShape="1">
-          <a:blip r:embed="rId4"/>
-          <a:srcRect t="6135" b="14205"/>
-          <a:stretch/>
-        </p:blipFill>
-        <p:spPr>
-          <a:xfrm>
-            <a:off x="7678736" y="643465"/>
-            <a:ext cx="4003193" cy="2551176"/>
-          </a:xfrm>
-          <a:prstGeom prst="rect">
-            <a:avLst/>
-          </a:prstGeom>
-        </p:spPr>
-      </p:pic>
-      <p:pic>
-        <p:nvPicPr>
-          <p:cNvPr id="15" name="Content Placeholder 14" descr="A close up of a map&#10;&#10;Description automatically generated">
-            <a:extLst>
-              <a:ext uri="{FF2B5EF4-FFF2-40B4-BE49-F238E27FC236}">
-                <a16:creationId xmlns:a16="http://schemas.microsoft.com/office/drawing/2014/main" id="{F6AF0010-1D47-4F68-92CB-91EE4B09010F}"/>
-              </a:ext>
-            </a:extLst>
-          </p:cNvPr>
-          <p:cNvPicPr>
-            <a:picLocks noGrp="1" noChangeAspect="1"/>
-          </p:cNvPicPr>
-          <p:nvPr>
-            <p:ph sz="half" idx="2"/>
-          </p:nvPr>
-        </p:nvPicPr>
-        <p:blipFill rotWithShape="1">
-          <a:blip r:embed="rId5"/>
-          <a:srcRect t="10701" b="9638"/>
-          <a:stretch/>
-        </p:blipFill>
-        <p:spPr>
-          <a:xfrm>
-            <a:off x="7678736" y="3294291"/>
-            <a:ext cx="4003193" cy="2551176"/>
           </a:xfrm>
           <a:prstGeom prst="rect">
             <a:avLst/>
@@ -7509,6 +7448,64 @@
           </a:p>
         </p:txBody>
       </p:sp>
+      <p:pic>
+        <p:nvPicPr>
+          <p:cNvPr id="5" name="Content Placeholder 4" descr="A close up of a map&#10;&#10;Description automatically generated">
+            <a:extLst>
+              <a:ext uri="{FF2B5EF4-FFF2-40B4-BE49-F238E27FC236}">
+                <a16:creationId xmlns:a16="http://schemas.microsoft.com/office/drawing/2014/main" id="{FCFD8355-D876-BA40-A1DF-33D06E5805AA}"/>
+              </a:ext>
+            </a:extLst>
+          </p:cNvPr>
+          <p:cNvPicPr>
+            <a:picLocks noGrp="1" noChangeAspect="1"/>
+          </p:cNvPicPr>
+          <p:nvPr>
+            <p:ph sz="half" idx="1"/>
+          </p:nvPr>
+        </p:nvPicPr>
+        <p:blipFill>
+          <a:blip r:embed="rId4"/>
+          <a:stretch>
+            <a:fillRect/>
+          </a:stretch>
+        </p:blipFill>
+        <p:spPr>
+          <a:xfrm>
+            <a:off x="7798311" y="185056"/>
+            <a:ext cx="3883618" cy="3106895"/>
+          </a:xfrm>
+        </p:spPr>
+      </p:pic>
+      <p:pic>
+        <p:nvPicPr>
+          <p:cNvPr id="10" name="Content Placeholder 9" descr="A close up of a map&#10;&#10;Description automatically generated">
+            <a:extLst>
+              <a:ext uri="{FF2B5EF4-FFF2-40B4-BE49-F238E27FC236}">
+                <a16:creationId xmlns:a16="http://schemas.microsoft.com/office/drawing/2014/main" id="{85AE513E-7BE6-3E4B-92DB-2CB1D3A9CD16}"/>
+              </a:ext>
+            </a:extLst>
+          </p:cNvPr>
+          <p:cNvPicPr>
+            <a:picLocks noGrp="1" noChangeAspect="1"/>
+          </p:cNvPicPr>
+          <p:nvPr>
+            <p:ph sz="half" idx="2"/>
+          </p:nvPr>
+        </p:nvPicPr>
+        <p:blipFill>
+          <a:blip r:embed="rId5"/>
+          <a:stretch>
+            <a:fillRect/>
+          </a:stretch>
+        </p:blipFill>
+        <p:spPr>
+          <a:xfrm>
+            <a:off x="7798311" y="3463086"/>
+            <a:ext cx="3883618" cy="3106895"/>
+          </a:xfrm>
+        </p:spPr>
+      </p:pic>
     </p:spTree>
     <p:extLst>
       <p:ext uri="{BB962C8B-B14F-4D97-AF65-F5344CB8AC3E}">
@@ -7861,7 +7858,7 @@
         </p:nvSpPr>
         <p:spPr>
           <a:xfrm>
-            <a:off x="919119" y="293005"/>
+            <a:off x="919119" y="145692"/>
             <a:ext cx="10353762" cy="970450"/>
           </a:xfrm>
         </p:spPr>
@@ -7878,30 +7875,24 @@
           </a:p>
         </p:txBody>
       </p:sp>
-      <p:pic>
-        <p:nvPicPr>
-          <p:cNvPr id="15" name="Content Placeholder 7" descr="A screenshot of a map&#10;&#10;Description automatically generated">
+      <p:sp>
+        <p:nvSpPr>
+          <p:cNvPr id="16" name="Text Placeholder 2">
             <a:extLst>
               <a:ext uri="{FF2B5EF4-FFF2-40B4-BE49-F238E27FC236}">
-                <a16:creationId xmlns:a16="http://schemas.microsoft.com/office/drawing/2014/main" id="{AAC29350-8729-48B5-936A-25E908534248}"/>
+                <a16:creationId xmlns:a16="http://schemas.microsoft.com/office/drawing/2014/main" id="{C30166F9-402E-42FC-83B2-B8C546174052}"/>
               </a:ext>
             </a:extLst>
           </p:cNvPr>
-          <p:cNvPicPr>
-            <a:picLocks noChangeAspect="1"/>
-          </p:cNvPicPr>
+          <p:cNvSpPr txBox="1">
+            <a:spLocks/>
+          </p:cNvSpPr>
           <p:nvPr/>
-        </p:nvPicPr>
-        <p:blipFill>
-          <a:blip r:embed="rId2"/>
-          <a:stretch>
-            <a:fillRect/>
-          </a:stretch>
-        </p:blipFill>
+        </p:nvSpPr>
         <p:spPr>
           <a:xfrm>
-            <a:off x="314411" y="1461976"/>
-            <a:ext cx="7383567" cy="4201978"/>
+            <a:off x="7500256" y="1066800"/>
+            <a:ext cx="4452258" cy="5715000"/>
           </a:xfrm>
           <a:prstGeom prst="rect">
             <a:avLst/>
@@ -7914,40 +7905,9 @@
             </a:outerShdw>
           </a:effectLst>
         </p:spPr>
-      </p:pic>
-      <p:sp>
-        <p:nvSpPr>
-          <p:cNvPr id="16" name="Text Placeholder 2">
-            <a:extLst>
-              <a:ext uri="{FF2B5EF4-FFF2-40B4-BE49-F238E27FC236}">
-                <a16:creationId xmlns:a16="http://schemas.microsoft.com/office/drawing/2014/main" id="{C30166F9-402E-42FC-83B2-B8C546174052}"/>
-              </a:ext>
-            </a:extLst>
-          </p:cNvPr>
-          <p:cNvSpPr txBox="1">
-            <a:spLocks/>
-          </p:cNvSpPr>
-          <p:nvPr/>
-        </p:nvSpPr>
-        <p:spPr>
-          <a:xfrm>
-            <a:off x="7965194" y="1452947"/>
-            <a:ext cx="3868007" cy="4934498"/>
-          </a:xfrm>
-          <a:prstGeom prst="rect">
-            <a:avLst/>
-          </a:prstGeom>
-          <a:effectLst>
-            <a:outerShdw blurRad="25400" dir="17880000">
-              <a:srgbClr val="000000">
-                <a:alpha val="46000"/>
-              </a:srgbClr>
-            </a:outerShdw>
-          </a:effectLst>
-        </p:spPr>
         <p:txBody>
           <a:bodyPr vert="horz" lIns="91440" tIns="45720" rIns="91440" bIns="45720" rtlCol="0" anchor="t">
-            <a:normAutofit/>
+            <a:normAutofit lnSpcReduction="10000"/>
           </a:bodyPr>
           <a:lstStyle>
             <a:lvl1pPr marL="342900" indent="-306000" algn="l" defTabSz="457200" rtl="0" eaLnBrk="1" latinLnBrk="0" hangingPunct="1">
@@ -8302,7 +8262,7 @@
               <a:buChar char="•"/>
             </a:pPr>
             <a:r>
-              <a:rPr lang="en-US" sz="1800"/>
+              <a:rPr lang="en-US" sz="1800" dirty="0"/>
               <a:t>Most of the accidents happen at visibility of 10 mi and same was removed from the dataset.</a:t>
             </a:r>
           </a:p>
@@ -8312,7 +8272,7 @@
               <a:buChar char="•"/>
             </a:pPr>
             <a:r>
-              <a:rPr lang="en-US" sz="1800"/>
+              <a:rPr lang="en-US" sz="1800" dirty="0"/>
               <a:t>Rows of data with wind speed greater than 100 mph was removed. </a:t>
             </a:r>
           </a:p>
@@ -8322,7 +8282,7 @@
               <a:buChar char="•"/>
             </a:pPr>
             <a:r>
-              <a:rPr lang="en-US" sz="1800"/>
+              <a:rPr lang="en-US" sz="1800" dirty="0"/>
               <a:t>Accidents have little correlation to temperature.</a:t>
             </a:r>
           </a:p>
@@ -8332,7 +8292,7 @@
               <a:buChar char="•"/>
             </a:pPr>
             <a:r>
-              <a:rPr lang="en-US" sz="1800"/>
+              <a:rPr lang="en-US" sz="1800" dirty="0"/>
               <a:t>Accidents have a strong correlation to humidity</a:t>
             </a:r>
           </a:p>
@@ -8342,7 +8302,7 @@
               <a:buChar char="•"/>
             </a:pPr>
             <a:r>
-              <a:rPr lang="en-US" sz="1800"/>
+              <a:rPr lang="en-US" sz="1800" dirty="0"/>
               <a:t>Accidents have a weak negative correlation to visibility </a:t>
             </a:r>
           </a:p>
@@ -8352,13 +8312,62 @@
               <a:buChar char="•"/>
             </a:pPr>
             <a:r>
-              <a:rPr lang="en-US" sz="1800"/>
+              <a:rPr lang="en-US" sz="1800" dirty="0"/>
               <a:t>Accidents have a moderate negative correlation to wind speed. </a:t>
             </a:r>
-            <a:endParaRPr lang="en-US" sz="1800" dirty="0"/>
-          </a:p>
-        </p:txBody>
-      </p:sp>
+          </a:p>
+          <a:p>
+            <a:pPr indent="-342900">
+              <a:buFont typeface="Arial" panose="020B0604020202020204" pitchFamily="34" charset="0"/>
+              <a:buChar char="•"/>
+            </a:pPr>
+            <a:r>
+              <a:rPr lang="en-US" sz="1800" dirty="0"/>
+              <a:t>The correlation of accidents and precipitation is very weak.</a:t>
+            </a:r>
+          </a:p>
+          <a:p>
+            <a:pPr indent="-342900">
+              <a:buFont typeface="Arial" panose="020B0604020202020204" pitchFamily="34" charset="0"/>
+              <a:buChar char="•"/>
+            </a:pPr>
+            <a:r>
+              <a:rPr lang="en-US" sz="1800" dirty="0"/>
+              <a:t>The correlation of accidents and wind chill is moderately positive.</a:t>
+            </a:r>
+          </a:p>
+        </p:txBody>
+      </p:sp>
+      <p:pic>
+        <p:nvPicPr>
+          <p:cNvPr id="3" name="Picture 2" descr="A picture containing screenshot&#10;&#10;Description automatically generated">
+            <a:extLst>
+              <a:ext uri="{FF2B5EF4-FFF2-40B4-BE49-F238E27FC236}">
+                <a16:creationId xmlns:a16="http://schemas.microsoft.com/office/drawing/2014/main" id="{6E2507D2-A568-D648-ADF3-2E5C0C9A8735}"/>
+              </a:ext>
+            </a:extLst>
+          </p:cNvPr>
+          <p:cNvPicPr>
+            <a:picLocks noChangeAspect="1"/>
+          </p:cNvPicPr>
+          <p:nvPr/>
+        </p:nvPicPr>
+        <p:blipFill>
+          <a:blip r:embed="rId2"/>
+          <a:stretch>
+            <a:fillRect/>
+          </a:stretch>
+        </p:blipFill>
+        <p:spPr>
+          <a:xfrm>
+            <a:off x="239486" y="1198140"/>
+            <a:ext cx="7093381" cy="5061146"/>
+          </a:xfrm>
+          <a:prstGeom prst="rect">
+            <a:avLst/>
+          </a:prstGeom>
+        </p:spPr>
+      </p:pic>
     </p:spTree>
     <p:extLst>
       <p:ext uri="{BB962C8B-B14F-4D97-AF65-F5344CB8AC3E}">
@@ -8868,23 +8877,7 @@
                   <a:srgbClr val="00B050"/>
                 </a:solidFill>
               </a:rPr>
-              <a:t>Different modelling methodologies and other factors can be combined to analyze and determine impact of </a:t>
-            </a:r>
-            <a:r>
-              <a:rPr lang="en-US" sz="1800">
-                <a:solidFill>
-                  <a:srgbClr val="00B050"/>
-                </a:solidFill>
-              </a:rPr>
-              <a:t>combination of </a:t>
-            </a:r>
-            <a:r>
-              <a:rPr lang="en-US" sz="1800" dirty="0">
-                <a:solidFill>
-                  <a:srgbClr val="00B050"/>
-                </a:solidFill>
-              </a:rPr>
-              <a:t>factors to number of accidents.</a:t>
+              <a:t>Different modelling methodologies and other factors can be combined to analyze and determine impact of combination of factors to number of accidents.</a:t>
             </a:r>
           </a:p>
         </p:txBody>
@@ -9479,7 +9472,7 @@
         </p:spPr>
         <p:txBody>
           <a:bodyPr>
-            <a:normAutofit fontScale="92500" lnSpcReduction="20000"/>
+            <a:normAutofit/>
           </a:bodyPr>
           <a:lstStyle/>
           <a:p>
@@ -9498,12 +9491,6 @@
             <a:r>
               <a:rPr lang="en-US" sz="2800" dirty="0"/>
               <a:t>More models can be designed and applied to analyze cumulative impact of multiple factors on accidents.</a:t>
-            </a:r>
-          </a:p>
-          <a:p>
-            <a:r>
-              <a:rPr lang="en-US" sz="2800" dirty="0"/>
-              <a:t>Look into correlation of precipitation specifically, as rain is the most relevant weather factor on accidents. </a:t>
             </a:r>
           </a:p>
           <a:p>
@@ -9524,6 +9511,100 @@
     <p:extLst>
       <p:ext uri="{BB962C8B-B14F-4D97-AF65-F5344CB8AC3E}">
         <p14:creationId xmlns:p14="http://schemas.microsoft.com/office/powerpoint/2010/main" val="597008672"/>
+      </p:ext>
+    </p:extLst>
+  </p:cSld>
+  <p:clrMapOvr>
+    <a:masterClrMapping/>
+  </p:clrMapOvr>
+</p:sld>
+</file>
+
+<file path=ppt/slides/slide17.xml><?xml version="1.0" encoding="utf-8"?>
+<p:sld xmlns:a="http://schemas.openxmlformats.org/drawingml/2006/main" xmlns:r="http://schemas.openxmlformats.org/officeDocument/2006/relationships" xmlns:p="http://schemas.openxmlformats.org/presentationml/2006/main">
+  <p:cSld>
+    <p:spTree>
+      <p:nvGrpSpPr>
+        <p:cNvPr id="1" name=""/>
+        <p:cNvGrpSpPr/>
+        <p:nvPr/>
+      </p:nvGrpSpPr>
+      <p:grpSpPr>
+        <a:xfrm>
+          <a:off x="0" y="0"/>
+          <a:ext cx="0" cy="0"/>
+          <a:chOff x="0" y="0"/>
+          <a:chExt cx="0" cy="0"/>
+        </a:xfrm>
+      </p:grpSpPr>
+      <p:sp>
+        <p:nvSpPr>
+          <p:cNvPr id="2" name="Title 1">
+            <a:extLst>
+              <a:ext uri="{FF2B5EF4-FFF2-40B4-BE49-F238E27FC236}">
+                <a16:creationId xmlns:a16="http://schemas.microsoft.com/office/drawing/2014/main" id="{20CD627E-2FAF-4C90-9BE0-9DC4C339B387}"/>
+              </a:ext>
+            </a:extLst>
+          </p:cNvPr>
+          <p:cNvSpPr>
+            <a:spLocks noGrp="1"/>
+          </p:cNvSpPr>
+          <p:nvPr>
+            <p:ph type="ctrTitle"/>
+          </p:nvPr>
+        </p:nvSpPr>
+        <p:spPr/>
+        <p:txBody>
+          <a:bodyPr/>
+          <a:lstStyle/>
+          <a:p>
+            <a:r>
+              <a:rPr lang="en-US" dirty="0"/>
+              <a:t>Link to Dataset in Kaggle</a:t>
+            </a:r>
+          </a:p>
+        </p:txBody>
+      </p:sp>
+      <p:sp>
+        <p:nvSpPr>
+          <p:cNvPr id="3" name="Subtitle 2">
+            <a:extLst>
+              <a:ext uri="{FF2B5EF4-FFF2-40B4-BE49-F238E27FC236}">
+                <a16:creationId xmlns:a16="http://schemas.microsoft.com/office/drawing/2014/main" id="{D24B04AF-92A7-4B59-BA7E-BB22B0EF613F}"/>
+              </a:ext>
+            </a:extLst>
+          </p:cNvPr>
+          <p:cNvSpPr>
+            <a:spLocks noGrp="1"/>
+          </p:cNvSpPr>
+          <p:nvPr>
+            <p:ph type="subTitle" idx="1"/>
+          </p:nvPr>
+        </p:nvSpPr>
+        <p:spPr/>
+        <p:txBody>
+          <a:bodyPr/>
+          <a:lstStyle/>
+          <a:p>
+            <a:r>
+              <a:rPr lang="en-US" dirty="0"/>
+              <a:t>US Accidents 2016-2019 : </a:t>
+            </a:r>
+            <a:r>
+              <a:rPr lang="en-US" u="sng" dirty="0">
+                <a:effectLst/>
+                <a:hlinkClick r:id="rId2"/>
+              </a:rPr>
+              <a:t>https://www.kaggle.com/sobhanmoosavi/us-accidents</a:t>
+            </a:r>
+            <a:endParaRPr lang="en-US" dirty="0"/>
+          </a:p>
+        </p:txBody>
+      </p:sp>
+    </p:spTree>
+    <p:extLst>
+      <p:ext uri="{BB962C8B-B14F-4D97-AF65-F5344CB8AC3E}">
+        <p14:creationId xmlns:p14="http://schemas.microsoft.com/office/powerpoint/2010/main" val="4099447244"/>
       </p:ext>
     </p:extLst>
   </p:cSld>
@@ -9955,19 +10036,29 @@
           <a:p>
             <a:r>
               <a:rPr lang="en-US" dirty="0"/>
-              <a:t>We explored data on U.S. accidents from 2016 to 2020 with approximately 3 million recorded accidents. The dataset includes accidents in the 49 contiguous states. </a:t>
-            </a:r>
-          </a:p>
-          <a:p>
+              <a:t>We explored data on </a:t>
+            </a:r>
+            <a:r>
+              <a:rPr lang="en-US" dirty="0">
+                <a:hlinkClick r:id="rId2"/>
+              </a:rPr>
+              <a:t>U.S. accidents from 2016 to 2019 </a:t>
+            </a:r>
             <a:r>
               <a:rPr lang="en-US" dirty="0"/>
-              <a:t>The dataset was collected in real time and includes factors associated with the accidents, such as location, time, weather conditions and severity of accidents, among others.</a:t>
+              <a:t>with approximately 3 million recorded accidents. The dataset includes accidents in the 49 contiguous states. </a:t>
             </a:r>
           </a:p>
           <a:p>
             <a:r>
               <a:rPr lang="en-US" dirty="0"/>
-              <a:t>We used US Census Data for population density analysis and Google Maps API for plotting.</a:t>
+              <a:t>The dataset was collected in real time and includes factors associated with the accidents, such as location, time, weather and environmental conditions and severity of accidents, among others.</a:t>
+            </a:r>
+          </a:p>
+          <a:p>
+            <a:r>
+              <a:rPr lang="en-US" dirty="0"/>
+              <a:t>We used US Census Data for our population density analysis and Google Maps API for its plotting.</a:t>
             </a:r>
           </a:p>
           <a:p>
@@ -9990,7 +10081,7 @@
             <a:r>
               <a:rPr lang="en-US" sz="1200" dirty="0">
                 <a:effectLst/>
-                <a:hlinkClick r:id="rId2"/>
+                <a:hlinkClick r:id="rId3"/>
               </a:rPr>
               <a:t>A Countrywide Traffic Accident Dataset</a:t>
             </a:r>
@@ -10012,7 +10103,7 @@
             <a:r>
               <a:rPr lang="en-US" sz="1200" dirty="0">
                 <a:effectLst/>
-                <a:hlinkClick r:id="rId3"/>
+                <a:hlinkClick r:id="rId4"/>
               </a:rPr>
               <a:t>"Accident Risk Prediction based on Heterogeneous Sparse Data: New Dataset and Insights."</a:t>
             </a:r>
@@ -10112,8 +10203,8 @@
         </p:nvSpPr>
         <p:spPr>
           <a:xfrm>
-            <a:off x="913795" y="1866900"/>
-            <a:ext cx="10353762" cy="4381500"/>
+            <a:off x="762000" y="1491343"/>
+            <a:ext cx="10505557" cy="4757057"/>
           </a:xfrm>
         </p:spPr>
         <p:txBody>
@@ -10255,13 +10346,13 @@
           <a:p>
             <a:r>
               <a:rPr lang="en-US" dirty="0"/>
+              <a:t>We simplified time by dropping the minutes and keeping the hours to analyze traffic accidents by hours of the day.</a:t>
+            </a:r>
+          </a:p>
+          <a:p>
+            <a:r>
+              <a:rPr lang="en-US" dirty="0"/>
               <a:t>We grouped seasons into the following categories: Winter (Dec, Jan, Feb); Spring (Mar, Apr, May); Summer (Jun, Jul, Aug); Fall (Sept, Oct, Nov).</a:t>
-            </a:r>
-          </a:p>
-          <a:p>
-            <a:r>
-              <a:rPr lang="en-US" dirty="0"/>
-              <a:t>We simplified time by dropping the minutes and keeping the hours to analyze traffic accidents by hours of the day.</a:t>
             </a:r>
           </a:p>
           <a:p>
@@ -10269,6 +10360,12 @@
               <a:rPr lang="en-US" dirty="0"/>
               <a:t>We grouped weather conditions into six broad categories: Clear, Rain, Fog, Snow, Sleet, Wind.</a:t>
             </a:r>
+          </a:p>
+          <a:p>
+            <a:pPr marL="36900" indent="0">
+              <a:buNone/>
+            </a:pPr>
+            <a:endParaRPr lang="en-US" dirty="0"/>
           </a:p>
           <a:p>
             <a:endParaRPr lang="en-US" dirty="0"/>
@@ -10477,7 +10574,7 @@
         <p:spPr>
           <a:xfrm>
             <a:off x="4203491" y="4568935"/>
-            <a:ext cx="3785016" cy="2308324"/>
+            <a:ext cx="3785016" cy="2031325"/>
           </a:xfrm>
           <a:prstGeom prst="rect">
             <a:avLst/>
@@ -10498,7 +10595,7 @@
           <a:p>
             <a:r>
               <a:rPr lang="en-US" dirty="0"/>
-              <a:t>Note: Severity level =  impact on traffic; a number between 1 and 4, where 1 indicates the least impact on traffic (i.e., short delay and 4 indicates high impact on traffic – length of impact has no relevance).</a:t>
+              <a:t>Note: Severity level =  impact on traffic; a number between 1 and 4, where 1 indicates the least impact on traffic (i.e., short delay and 4 indicates high impact on traffic).</a:t>
             </a:r>
           </a:p>
         </p:txBody>
@@ -10573,7 +10670,7 @@
           <p:cNvPr id="2" name="Title 1">
             <a:extLst>
               <a:ext uri="{FF2B5EF4-FFF2-40B4-BE49-F238E27FC236}">
-                <a16:creationId xmlns:a16="http://schemas.microsoft.com/office/drawing/2014/main" id="{73A3485B-217A-4561-BBC0-80027F50DE3E}"/>
+                <a16:creationId xmlns:a16="http://schemas.microsoft.com/office/drawing/2014/main" id="{7BDD3178-CA0A-D941-A09F-20361490E87E}"/>
               </a:ext>
             </a:extLst>
           </p:cNvPr>
@@ -10584,26 +10681,29 @@
             <p:ph type="title"/>
           </p:nvPr>
         </p:nvSpPr>
-        <p:spPr/>
-        <p:txBody>
-          <a:bodyPr>
-            <a:normAutofit/>
-          </a:bodyPr>
+        <p:spPr>
+          <a:xfrm>
+            <a:off x="919119" y="159895"/>
+            <a:ext cx="10353762" cy="1257300"/>
+          </a:xfrm>
+        </p:spPr>
+        <p:txBody>
+          <a:bodyPr/>
           <a:lstStyle/>
           <a:p>
             <a:r>
               <a:rPr lang="en-US" dirty="0"/>
-              <a:t>Traffic Accidents Across the US</a:t>
+              <a:t>Traffic Accidents Across States and Cities</a:t>
             </a:r>
           </a:p>
         </p:txBody>
       </p:sp>
       <p:pic>
         <p:nvPicPr>
-          <p:cNvPr id="4" name="Content Placeholder 3">
+          <p:cNvPr id="5" name="Content Placeholder 4" descr="A screenshot of a social media post&#10;&#10;Description automatically generated">
             <a:extLst>
               <a:ext uri="{FF2B5EF4-FFF2-40B4-BE49-F238E27FC236}">
-                <a16:creationId xmlns:a16="http://schemas.microsoft.com/office/drawing/2014/main" id="{40C5D980-EAF7-4529-A9B8-310B0CE21A03}"/>
+                <a16:creationId xmlns:a16="http://schemas.microsoft.com/office/drawing/2014/main" id="{E1111EBE-2EEE-8E45-A803-AE76DC479DDF}"/>
               </a:ext>
             </a:extLst>
           </p:cNvPr>
@@ -10622,18 +10722,114 @@
         </p:blipFill>
         <p:spPr>
           <a:xfrm>
-            <a:off x="1341040" y="1788351"/>
-            <a:ext cx="9137138" cy="3714750"/>
+            <a:off x="3704218" y="1222324"/>
+            <a:ext cx="7896749" cy="2525218"/>
+          </a:xfrm>
+        </p:spPr>
+      </p:pic>
+      <p:pic>
+        <p:nvPicPr>
+          <p:cNvPr id="7" name="Picture 6" descr="A screenshot of a social media post&#10;&#10;Description automatically generated">
+            <a:extLst>
+              <a:ext uri="{FF2B5EF4-FFF2-40B4-BE49-F238E27FC236}">
+                <a16:creationId xmlns:a16="http://schemas.microsoft.com/office/drawing/2014/main" id="{15590CCD-50EE-5441-B2D7-30E79ACEDA1A}"/>
+              </a:ext>
+            </a:extLst>
+          </p:cNvPr>
+          <p:cNvPicPr>
+            <a:picLocks noChangeAspect="1"/>
+          </p:cNvPicPr>
+          <p:nvPr/>
+        </p:nvPicPr>
+        <p:blipFill>
+          <a:blip r:embed="rId3"/>
+          <a:stretch>
+            <a:fillRect/>
+          </a:stretch>
+        </p:blipFill>
+        <p:spPr>
+          <a:xfrm>
+            <a:off x="3704218" y="3903066"/>
+            <a:ext cx="7896749" cy="2525218"/>
           </a:xfrm>
           <a:prstGeom prst="rect">
             <a:avLst/>
           </a:prstGeom>
         </p:spPr>
       </p:pic>
+      <p:sp>
+        <p:nvSpPr>
+          <p:cNvPr id="10" name="Rectangle 9">
+            <a:extLst>
+              <a:ext uri="{FF2B5EF4-FFF2-40B4-BE49-F238E27FC236}">
+                <a16:creationId xmlns:a16="http://schemas.microsoft.com/office/drawing/2014/main" id="{4F126984-AE27-4147-93B2-27FE0D6E045A}"/>
+              </a:ext>
+            </a:extLst>
+          </p:cNvPr>
+          <p:cNvSpPr/>
+          <p:nvPr/>
+        </p:nvSpPr>
+        <p:spPr>
+          <a:xfrm>
+            <a:off x="434196" y="3903066"/>
+            <a:ext cx="3118471" cy="1477328"/>
+          </a:xfrm>
+          <a:prstGeom prst="rect">
+            <a:avLst/>
+          </a:prstGeom>
+        </p:spPr>
+        <p:txBody>
+          <a:bodyPr wrap="square">
+            <a:spAutoFit/>
+          </a:bodyPr>
+          <a:lstStyle/>
+          <a:p>
+            <a:r>
+              <a:rPr lang="en-US" dirty="0"/>
+              <a:t>Interestingly, of the top 10 cities with the most accidents across three years, only one city in California is on the list. Three cities in Texas are on the list. </a:t>
+            </a:r>
+          </a:p>
+        </p:txBody>
+      </p:sp>
+      <p:sp>
+        <p:nvSpPr>
+          <p:cNvPr id="13" name="TextBox 12">
+            <a:extLst>
+              <a:ext uri="{FF2B5EF4-FFF2-40B4-BE49-F238E27FC236}">
+                <a16:creationId xmlns:a16="http://schemas.microsoft.com/office/drawing/2014/main" id="{65D09981-4184-B640-BEA4-3B00383B497F}"/>
+              </a:ext>
+            </a:extLst>
+          </p:cNvPr>
+          <p:cNvSpPr txBox="1"/>
+          <p:nvPr/>
+        </p:nvSpPr>
+        <p:spPr>
+          <a:xfrm>
+            <a:off x="434197" y="1467389"/>
+            <a:ext cx="3118471" cy="923330"/>
+          </a:xfrm>
+          <a:prstGeom prst="rect">
+            <a:avLst/>
+          </a:prstGeom>
+          <a:noFill/>
+        </p:spPr>
+        <p:txBody>
+          <a:bodyPr wrap="square" rtlCol="0">
+            <a:spAutoFit/>
+          </a:bodyPr>
+          <a:lstStyle/>
+          <a:p>
+            <a:r>
+              <a:rPr lang="en-US" dirty="0"/>
+              <a:t>California surpassed other states significantly in the number of accidents across three years.</a:t>
+            </a:r>
+          </a:p>
+        </p:txBody>
+      </p:sp>
     </p:spTree>
     <p:extLst>
       <p:ext uri="{BB962C8B-B14F-4D97-AF65-F5344CB8AC3E}">
-        <p14:creationId xmlns:p14="http://schemas.microsoft.com/office/powerpoint/2010/main" val="2640335579"/>
+        <p14:creationId xmlns:p14="http://schemas.microsoft.com/office/powerpoint/2010/main" val="276205142"/>
       </p:ext>
     </p:extLst>
   </p:cSld>
@@ -10665,7 +10861,7 @@
           <p:cNvPr id="2" name="Title 1">
             <a:extLst>
               <a:ext uri="{FF2B5EF4-FFF2-40B4-BE49-F238E27FC236}">
-                <a16:creationId xmlns:a16="http://schemas.microsoft.com/office/drawing/2014/main" id="{7BDD3178-CA0A-D941-A09F-20361490E87E}"/>
+                <a16:creationId xmlns:a16="http://schemas.microsoft.com/office/drawing/2014/main" id="{73A3485B-217A-4561-BBC0-80027F50DE3E}"/>
               </a:ext>
             </a:extLst>
           </p:cNvPr>
@@ -10678,27 +10874,29 @@
         </p:nvSpPr>
         <p:spPr>
           <a:xfrm>
-            <a:off x="919119" y="159895"/>
+            <a:off x="919119" y="387002"/>
             <a:ext cx="10353762" cy="1257300"/>
           </a:xfrm>
         </p:spPr>
         <p:txBody>
-          <a:bodyPr/>
+          <a:bodyPr>
+            <a:normAutofit/>
+          </a:bodyPr>
           <a:lstStyle/>
           <a:p>
             <a:r>
               <a:rPr lang="en-US" dirty="0"/>
-              <a:t>Traffic Accidents Across States and Cities</a:t>
+              <a:t>Traffic Accidents Across the US</a:t>
             </a:r>
           </a:p>
         </p:txBody>
       </p:sp>
       <p:pic>
         <p:nvPicPr>
-          <p:cNvPr id="5" name="Content Placeholder 4" descr="A screenshot of a social media post&#10;&#10;Description automatically generated">
+          <p:cNvPr id="4" name="Content Placeholder 3">
             <a:extLst>
               <a:ext uri="{FF2B5EF4-FFF2-40B4-BE49-F238E27FC236}">
-                <a16:creationId xmlns:a16="http://schemas.microsoft.com/office/drawing/2014/main" id="{E1111EBE-2EEE-8E45-A803-AE76DC479DDF}"/>
+                <a16:creationId xmlns:a16="http://schemas.microsoft.com/office/drawing/2014/main" id="{40C5D980-EAF7-4529-A9B8-310B0CE21A03}"/>
               </a:ext>
             </a:extLst>
           </p:cNvPr>
@@ -10717,35 +10915,8 @@
         </p:blipFill>
         <p:spPr>
           <a:xfrm>
-            <a:off x="3704218" y="1222324"/>
-            <a:ext cx="7896749" cy="2525218"/>
-          </a:xfrm>
-        </p:spPr>
-      </p:pic>
-      <p:pic>
-        <p:nvPicPr>
-          <p:cNvPr id="7" name="Picture 6" descr="A screenshot of a social media post&#10;&#10;Description automatically generated">
-            <a:extLst>
-              <a:ext uri="{FF2B5EF4-FFF2-40B4-BE49-F238E27FC236}">
-                <a16:creationId xmlns:a16="http://schemas.microsoft.com/office/drawing/2014/main" id="{15590CCD-50EE-5441-B2D7-30E79ACEDA1A}"/>
-              </a:ext>
-            </a:extLst>
-          </p:cNvPr>
-          <p:cNvPicPr>
-            <a:picLocks noChangeAspect="1"/>
-          </p:cNvPicPr>
-          <p:nvPr/>
-        </p:nvPicPr>
-        <p:blipFill>
-          <a:blip r:embed="rId3"/>
-          <a:stretch>
-            <a:fillRect/>
-          </a:stretch>
-        </p:blipFill>
-        <p:spPr>
-          <a:xfrm>
-            <a:off x="3704218" y="3903066"/>
-            <a:ext cx="7896749" cy="2525218"/>
+            <a:off x="1341040" y="1788351"/>
+            <a:ext cx="9137138" cy="3714750"/>
           </a:xfrm>
           <a:prstGeom prst="rect">
             <a:avLst/>
@@ -10754,44 +10925,10 @@
       </p:pic>
       <p:sp>
         <p:nvSpPr>
-          <p:cNvPr id="10" name="Rectangle 9">
+          <p:cNvPr id="3" name="TextBox 2">
             <a:extLst>
               <a:ext uri="{FF2B5EF4-FFF2-40B4-BE49-F238E27FC236}">
-                <a16:creationId xmlns:a16="http://schemas.microsoft.com/office/drawing/2014/main" id="{4F126984-AE27-4147-93B2-27FE0D6E045A}"/>
-              </a:ext>
-            </a:extLst>
-          </p:cNvPr>
-          <p:cNvSpPr/>
-          <p:nvPr/>
-        </p:nvSpPr>
-        <p:spPr>
-          <a:xfrm>
-            <a:off x="434196" y="3903066"/>
-            <a:ext cx="3118471" cy="1477328"/>
-          </a:xfrm>
-          <a:prstGeom prst="rect">
-            <a:avLst/>
-          </a:prstGeom>
-        </p:spPr>
-        <p:txBody>
-          <a:bodyPr wrap="square">
-            <a:spAutoFit/>
-          </a:bodyPr>
-          <a:lstStyle/>
-          <a:p>
-            <a:r>
-              <a:rPr lang="en-US" dirty="0"/>
-              <a:t>Interestingly, of the top 10 cities with the most accidents across three years, only one city in California is on the list. Three cities in Texas are on the list. </a:t>
-            </a:r>
-          </a:p>
-        </p:txBody>
-      </p:sp>
-      <p:sp>
-        <p:nvSpPr>
-          <p:cNvPr id="13" name="TextBox 12">
-            <a:extLst>
-              <a:ext uri="{FF2B5EF4-FFF2-40B4-BE49-F238E27FC236}">
-                <a16:creationId xmlns:a16="http://schemas.microsoft.com/office/drawing/2014/main" id="{65D09981-4184-B640-BEA4-3B00383B497F}"/>
+                <a16:creationId xmlns:a16="http://schemas.microsoft.com/office/drawing/2014/main" id="{98049F2A-5D69-C54E-9A7F-55AFF9E8567C}"/>
               </a:ext>
             </a:extLst>
           </p:cNvPr>
@@ -10800,8 +10937,8 @@
         </p:nvSpPr>
         <p:spPr>
           <a:xfrm>
-            <a:off x="434197" y="1467389"/>
-            <a:ext cx="3118471" cy="923330"/>
+            <a:off x="1341040" y="5791199"/>
+            <a:ext cx="9137138" cy="646331"/>
           </a:xfrm>
           <a:prstGeom prst="rect">
             <a:avLst/>
@@ -10816,7 +10953,7 @@
           <a:p>
             <a:r>
               <a:rPr lang="en-US" dirty="0"/>
-              <a:t>California surpassed other states significantly in the number of accidents across three years.</a:t>
+              <a:t>Heatmap showing where most accidents are distributed within the top three months with the most accidents (2017 – 2019). </a:t>
             </a:r>
           </a:p>
         </p:txBody>
@@ -10824,7 +10961,7 @@
     </p:spTree>
     <p:extLst>
       <p:ext uri="{BB962C8B-B14F-4D97-AF65-F5344CB8AC3E}">
-        <p14:creationId xmlns:p14="http://schemas.microsoft.com/office/powerpoint/2010/main" val="276205142"/>
+        <p14:creationId xmlns:p14="http://schemas.microsoft.com/office/powerpoint/2010/main" val="2640335579"/>
       </p:ext>
     </p:extLst>
   </p:cSld>
@@ -10884,12 +11021,82 @@
           </a:p>
         </p:txBody>
       </p:sp>
+      <p:sp>
+        <p:nvSpPr>
+          <p:cNvPr id="8" name="TextBox 7">
+            <a:extLst>
+              <a:ext uri="{FF2B5EF4-FFF2-40B4-BE49-F238E27FC236}">
+                <a16:creationId xmlns:a16="http://schemas.microsoft.com/office/drawing/2014/main" id="{F43B374F-5FE3-B348-B994-AEC9F6903685}"/>
+              </a:ext>
+            </a:extLst>
+          </p:cNvPr>
+          <p:cNvSpPr txBox="1"/>
+          <p:nvPr/>
+        </p:nvSpPr>
+        <p:spPr>
+          <a:xfrm>
+            <a:off x="379145" y="5212066"/>
+            <a:ext cx="5506993" cy="646331"/>
+          </a:xfrm>
+          <a:prstGeom prst="rect">
+            <a:avLst/>
+          </a:prstGeom>
+          <a:noFill/>
+        </p:spPr>
+        <p:txBody>
+          <a:bodyPr wrap="square" rtlCol="0">
+            <a:spAutoFit/>
+          </a:bodyPr>
+          <a:lstStyle/>
+          <a:p>
+            <a:r>
+              <a:rPr lang="en-US" dirty="0"/>
+              <a:t>States with a higher population density also had higher rates of accidents. </a:t>
+            </a:r>
+          </a:p>
+        </p:txBody>
+      </p:sp>
+      <p:sp>
+        <p:nvSpPr>
+          <p:cNvPr id="9" name="TextBox 8">
+            <a:extLst>
+              <a:ext uri="{FF2B5EF4-FFF2-40B4-BE49-F238E27FC236}">
+                <a16:creationId xmlns:a16="http://schemas.microsoft.com/office/drawing/2014/main" id="{B4BEDE2A-43D7-8544-8FC3-5702DBF31AA0}"/>
+              </a:ext>
+            </a:extLst>
+          </p:cNvPr>
+          <p:cNvSpPr txBox="1"/>
+          <p:nvPr/>
+        </p:nvSpPr>
+        <p:spPr>
+          <a:xfrm>
+            <a:off x="6305863" y="5212064"/>
+            <a:ext cx="5506991" cy="923330"/>
+          </a:xfrm>
+          <a:prstGeom prst="rect">
+            <a:avLst/>
+          </a:prstGeom>
+          <a:noFill/>
+        </p:spPr>
+        <p:txBody>
+          <a:bodyPr wrap="square" rtlCol="0">
+            <a:spAutoFit/>
+          </a:bodyPr>
+          <a:lstStyle/>
+          <a:p>
+            <a:r>
+              <a:rPr lang="en-US" dirty="0"/>
+              <a:t>Looking further into the most populous state, California, we saw that counties with higher population densities also had higher rates of accidents. </a:t>
+            </a:r>
+          </a:p>
+        </p:txBody>
+      </p:sp>
       <p:pic>
         <p:nvPicPr>
-          <p:cNvPr id="5" name="Content Placeholder 4" descr="A screenshot of a social media post&#10;&#10;Description automatically generated">
+          <p:cNvPr id="10" name="Content Placeholder 9" descr="A screenshot of a map&#10;&#10;Description automatically generated">
             <a:extLst>
               <a:ext uri="{FF2B5EF4-FFF2-40B4-BE49-F238E27FC236}">
-                <a16:creationId xmlns:a16="http://schemas.microsoft.com/office/drawing/2014/main" id="{0F4298C9-2272-924C-B7C8-FCB39129032A}"/>
+                <a16:creationId xmlns:a16="http://schemas.microsoft.com/office/drawing/2014/main" id="{41942192-94D1-B34B-9E94-A8D371837566}"/>
               </a:ext>
             </a:extLst>
           </p:cNvPr>
@@ -10908,17 +11115,17 @@
         </p:blipFill>
         <p:spPr>
           <a:xfrm>
-            <a:off x="379145" y="1645934"/>
-            <a:ext cx="5506993" cy="3304196"/>
+            <a:off x="379145" y="1645932"/>
+            <a:ext cx="5604508" cy="3362705"/>
           </a:xfrm>
         </p:spPr>
       </p:pic>
       <p:pic>
         <p:nvPicPr>
-          <p:cNvPr id="7" name="Picture 6" descr="A screenshot of a social media post&#10;&#10;Description automatically generated">
+          <p:cNvPr id="12" name="Picture 11" descr="A screenshot of a map&#10;&#10;Description automatically generated">
             <a:extLst>
               <a:ext uri="{FF2B5EF4-FFF2-40B4-BE49-F238E27FC236}">
-                <a16:creationId xmlns:a16="http://schemas.microsoft.com/office/drawing/2014/main" id="{EEF4A977-330B-3C43-8775-D942F38F12A3}"/>
+                <a16:creationId xmlns:a16="http://schemas.microsoft.com/office/drawing/2014/main" id="{C6D7E116-C83A-014B-AD92-7DFE067E459C}"/>
               </a:ext>
             </a:extLst>
           </p:cNvPr>
@@ -10935,84 +11142,14 @@
         </p:blipFill>
         <p:spPr>
           <a:xfrm>
-            <a:off x="6305864" y="1645934"/>
-            <a:ext cx="5506994" cy="3304196"/>
+            <a:off x="6305863" y="1645933"/>
+            <a:ext cx="5604508" cy="3362705"/>
           </a:xfrm>
           <a:prstGeom prst="rect">
             <a:avLst/>
           </a:prstGeom>
         </p:spPr>
       </p:pic>
-      <p:sp>
-        <p:nvSpPr>
-          <p:cNvPr id="8" name="TextBox 7">
-            <a:extLst>
-              <a:ext uri="{FF2B5EF4-FFF2-40B4-BE49-F238E27FC236}">
-                <a16:creationId xmlns:a16="http://schemas.microsoft.com/office/drawing/2014/main" id="{F43B374F-5FE3-B348-B994-AEC9F6903685}"/>
-              </a:ext>
-            </a:extLst>
-          </p:cNvPr>
-          <p:cNvSpPr txBox="1"/>
-          <p:nvPr/>
-        </p:nvSpPr>
-        <p:spPr>
-          <a:xfrm>
-            <a:off x="379145" y="5212066"/>
-            <a:ext cx="5506993" cy="646331"/>
-          </a:xfrm>
-          <a:prstGeom prst="rect">
-            <a:avLst/>
-          </a:prstGeom>
-          <a:noFill/>
-        </p:spPr>
-        <p:txBody>
-          <a:bodyPr wrap="square" rtlCol="0">
-            <a:spAutoFit/>
-          </a:bodyPr>
-          <a:lstStyle/>
-          <a:p>
-            <a:r>
-              <a:rPr lang="en-US" dirty="0"/>
-              <a:t>States with a higher population density also had higher rates of accidents. </a:t>
-            </a:r>
-          </a:p>
-        </p:txBody>
-      </p:sp>
-      <p:sp>
-        <p:nvSpPr>
-          <p:cNvPr id="9" name="TextBox 8">
-            <a:extLst>
-              <a:ext uri="{FF2B5EF4-FFF2-40B4-BE49-F238E27FC236}">
-                <a16:creationId xmlns:a16="http://schemas.microsoft.com/office/drawing/2014/main" id="{B4BEDE2A-43D7-8544-8FC3-5702DBF31AA0}"/>
-              </a:ext>
-            </a:extLst>
-          </p:cNvPr>
-          <p:cNvSpPr txBox="1"/>
-          <p:nvPr/>
-        </p:nvSpPr>
-        <p:spPr>
-          <a:xfrm>
-            <a:off x="6305863" y="5212064"/>
-            <a:ext cx="5506991" cy="923330"/>
-          </a:xfrm>
-          <a:prstGeom prst="rect">
-            <a:avLst/>
-          </a:prstGeom>
-          <a:noFill/>
-        </p:spPr>
-        <p:txBody>
-          <a:bodyPr wrap="square" rtlCol="0">
-            <a:spAutoFit/>
-          </a:bodyPr>
-          <a:lstStyle/>
-          <a:p>
-            <a:r>
-              <a:rPr lang="en-US" dirty="0"/>
-              <a:t>Looking further into the most populous state, California, we saw that counties with higher population densities also had higher rates of accidents. </a:t>
-            </a:r>
-          </a:p>
-        </p:txBody>
-      </p:sp>
     </p:spTree>
     <p:extLst>
       <p:ext uri="{BB962C8B-B14F-4D97-AF65-F5344CB8AC3E}">
@@ -11590,6 +11727,15 @@
 </file>
 
 <file path=customXml/item1.xml><?xml version="1.0" encoding="utf-8"?>
+<p:properties xmlns:p="http://schemas.microsoft.com/office/2006/metadata/properties" xmlns:xsi="http://www.w3.org/2001/XMLSchema-instance" xmlns:pc="http://schemas.microsoft.com/office/infopath/2007/PartnerControls">
+  <documentManagement>
+    <Status xmlns="71af3243-3dd4-4a8d-8c0d-dd76da1f02a5">Not started</Status>
+    <MediaServiceKeyPoints xmlns="71af3243-3dd4-4a8d-8c0d-dd76da1f02a5" xsi:nil="true"/>
+  </documentManagement>
+</p:properties>
+</file>
+
+<file path=customXml/item2.xml><?xml version="1.0" encoding="utf-8"?>
 <ct:contentTypeSchema xmlns:ct="http://schemas.microsoft.com/office/2006/metadata/contentType" xmlns:ma="http://schemas.microsoft.com/office/2006/metadata/properties/metaAttributes" ct:_="" ma:_="" ma:contentTypeName="Document" ma:contentTypeID="0x01010079F111ED35F8CC479449609E8A0923A6" ma:contentTypeVersion="12" ma:contentTypeDescription="Create a new document." ma:contentTypeScope="" ma:versionID="a410dd7f93c95333ffa1b60ed6adedd1">
   <xsd:schema xmlns:xsd="http://www.w3.org/2001/XMLSchema" xmlns:xs="http://www.w3.org/2001/XMLSchema" xmlns:p="http://schemas.microsoft.com/office/2006/metadata/properties" xmlns:ns2="71af3243-3dd4-4a8d-8c0d-dd76da1f02a5" xmlns:ns3="16c05727-aa75-4e4a-9b5f-8a80a1165891" targetNamespace="http://schemas.microsoft.com/office/2006/metadata/properties" ma:root="true" ma:fieldsID="a936d9baba76aa3866493feff160faab" ns2:_="" ns3:_="">
     <xsd:import namespace="71af3243-3dd4-4a8d-8c0d-dd76da1f02a5"/>
@@ -11810,7 +11956,7 @@
 </ct:contentTypeSchema>
 </file>
 
-<file path=customXml/item2.xml><?xml version="1.0" encoding="utf-8"?>
+<file path=customXml/item3.xml><?xml version="1.0" encoding="utf-8"?>
 <?mso-contentType ?>
 <FormTemplates xmlns="http://schemas.microsoft.com/sharepoint/v3/contenttype/forms">
   <Display>DocumentLibraryForm</Display>
@@ -11819,16 +11965,17 @@
 </FormTemplates>
 </file>
 
-<file path=customXml/item3.xml><?xml version="1.0" encoding="utf-8"?>
-<p:properties xmlns:p="http://schemas.microsoft.com/office/2006/metadata/properties" xmlns:xsi="http://www.w3.org/2001/XMLSchema-instance" xmlns:pc="http://schemas.microsoft.com/office/infopath/2007/PartnerControls">
-  <documentManagement>
-    <Status xmlns="71af3243-3dd4-4a8d-8c0d-dd76da1f02a5">Not started</Status>
-    <MediaServiceKeyPoints xmlns="71af3243-3dd4-4a8d-8c0d-dd76da1f02a5" xsi:nil="true"/>
-  </documentManagement>
-</p:properties>
+<file path=customXml/itemProps1.xml><?xml version="1.0" encoding="utf-8"?>
+<ds:datastoreItem xmlns:ds="http://schemas.openxmlformats.org/officeDocument/2006/customXml" ds:itemID="{2C4C00F4-06E9-43E3-AD97-88A857CEFA82}">
+  <ds:schemaRefs>
+    <ds:schemaRef ds:uri="http://schemas.microsoft.com/office/2006/metadata/properties"/>
+    <ds:schemaRef ds:uri="http://schemas.microsoft.com/office/infopath/2007/PartnerControls"/>
+    <ds:schemaRef ds:uri="71af3243-3dd4-4a8d-8c0d-dd76da1f02a5"/>
+  </ds:schemaRefs>
+</ds:datastoreItem>
 </file>
 
-<file path=customXml/itemProps1.xml><?xml version="1.0" encoding="utf-8"?>
+<file path=customXml/itemProps2.xml><?xml version="1.0" encoding="utf-8"?>
 <ds:datastoreItem xmlns:ds="http://schemas.openxmlformats.org/officeDocument/2006/customXml" ds:itemID="{0585E981-8C91-4205-A0C3-C991F42B4C9E}">
   <ds:schemaRefs>
     <ds:schemaRef ds:uri="http://schemas.microsoft.com/office/2006/metadata/contentType"/>
@@ -11847,20 +11994,10 @@
 </ds:datastoreItem>
 </file>
 
-<file path=customXml/itemProps2.xml><?xml version="1.0" encoding="utf-8"?>
+<file path=customXml/itemProps3.xml><?xml version="1.0" encoding="utf-8"?>
 <ds:datastoreItem xmlns:ds="http://schemas.openxmlformats.org/officeDocument/2006/customXml" ds:itemID="{64B270AB-C138-415C-897E-3C24487DECF1}">
   <ds:schemaRefs>
     <ds:schemaRef ds:uri="http://schemas.microsoft.com/sharepoint/v3/contenttype/forms"/>
   </ds:schemaRefs>
 </ds:datastoreItem>
-</file>
-
-<file path=customXml/itemProps3.xml><?xml version="1.0" encoding="utf-8"?>
-<ds:datastoreItem xmlns:ds="http://schemas.openxmlformats.org/officeDocument/2006/customXml" ds:itemID="{2C4C00F4-06E9-43E3-AD97-88A857CEFA82}">
-  <ds:schemaRefs>
-    <ds:schemaRef ds:uri="http://schemas.microsoft.com/office/2006/metadata/properties"/>
-    <ds:schemaRef ds:uri="http://schemas.microsoft.com/office/infopath/2007/PartnerControls"/>
-    <ds:schemaRef ds:uri="71af3243-3dd4-4a8d-8c0d-dd76da1f02a5"/>
-  </ds:schemaRefs>
-</ds:datastoreItem>
 </file>
</xml_diff>